<commit_message>
- Failed to remove first page - Updated cover page - Removed empty pages and duplicated headlines - Changed link color to MüCOS blue
</commit_message>
<xml_diff>
--- a/images/cover.pptx
+++ b/images/cover.pptx
@@ -2,20 +2,20 @@
 <file path=ppt/presentation.xml><?xml version="1.0" encoding="utf-8"?>
 <p:presentation xmlns:a="http://schemas.openxmlformats.org/drawingml/2006/main" xmlns:r="http://schemas.openxmlformats.org/officeDocument/2006/relationships" xmlns:p="http://schemas.openxmlformats.org/presentationml/2006/main" saveSubsetFonts="1">
   <p:sldMasterIdLst>
-    <p:sldMasterId id="2147483648" r:id="rId1"/>
+    <p:sldMasterId id="2147483660" r:id="rId1"/>
   </p:sldMasterIdLst>
   <p:sldIdLst>
     <p:sldId id="256" r:id="rId2"/>
     <p:sldId id="257" r:id="rId3"/>
     <p:sldId id="258" r:id="rId4"/>
   </p:sldIdLst>
-  <p:sldSz cx="12192000" cy="6858000"/>
+  <p:sldSz cx="6858000" cy="9906000" type="A4"/>
   <p:notesSz cx="6858000" cy="9144000"/>
   <p:defaultTextStyle>
     <a:defPPr>
-      <a:defRPr lang="de-DE"/>
+      <a:defRPr lang="en-US"/>
     </a:defPPr>
-    <a:lvl1pPr marL="0" algn="l" defTabSz="914400" rtl="0" eaLnBrk="1" latinLnBrk="0" hangingPunct="1">
+    <a:lvl1pPr marL="0" algn="l" defTabSz="457200" rtl="0" eaLnBrk="1" latinLnBrk="0" hangingPunct="1">
       <a:defRPr sz="1800" kern="1200">
         <a:solidFill>
           <a:schemeClr val="tx1"/>
@@ -25,7 +25,7 @@
         <a:cs typeface="+mn-cs"/>
       </a:defRPr>
     </a:lvl1pPr>
-    <a:lvl2pPr marL="457200" algn="l" defTabSz="914400" rtl="0" eaLnBrk="1" latinLnBrk="0" hangingPunct="1">
+    <a:lvl2pPr marL="457200" algn="l" defTabSz="457200" rtl="0" eaLnBrk="1" latinLnBrk="0" hangingPunct="1">
       <a:defRPr sz="1800" kern="1200">
         <a:solidFill>
           <a:schemeClr val="tx1"/>
@@ -35,7 +35,7 @@
         <a:cs typeface="+mn-cs"/>
       </a:defRPr>
     </a:lvl2pPr>
-    <a:lvl3pPr marL="914400" algn="l" defTabSz="914400" rtl="0" eaLnBrk="1" latinLnBrk="0" hangingPunct="1">
+    <a:lvl3pPr marL="914400" algn="l" defTabSz="457200" rtl="0" eaLnBrk="1" latinLnBrk="0" hangingPunct="1">
       <a:defRPr sz="1800" kern="1200">
         <a:solidFill>
           <a:schemeClr val="tx1"/>
@@ -45,7 +45,7 @@
         <a:cs typeface="+mn-cs"/>
       </a:defRPr>
     </a:lvl3pPr>
-    <a:lvl4pPr marL="1371600" algn="l" defTabSz="914400" rtl="0" eaLnBrk="1" latinLnBrk="0" hangingPunct="1">
+    <a:lvl4pPr marL="1371600" algn="l" defTabSz="457200" rtl="0" eaLnBrk="1" latinLnBrk="0" hangingPunct="1">
       <a:defRPr sz="1800" kern="1200">
         <a:solidFill>
           <a:schemeClr val="tx1"/>
@@ -55,7 +55,7 @@
         <a:cs typeface="+mn-cs"/>
       </a:defRPr>
     </a:lvl4pPr>
-    <a:lvl5pPr marL="1828800" algn="l" defTabSz="914400" rtl="0" eaLnBrk="1" latinLnBrk="0" hangingPunct="1">
+    <a:lvl5pPr marL="1828800" algn="l" defTabSz="457200" rtl="0" eaLnBrk="1" latinLnBrk="0" hangingPunct="1">
       <a:defRPr sz="1800" kern="1200">
         <a:solidFill>
           <a:schemeClr val="tx1"/>
@@ -65,7 +65,7 @@
         <a:cs typeface="+mn-cs"/>
       </a:defRPr>
     </a:lvl5pPr>
-    <a:lvl6pPr marL="2286000" algn="l" defTabSz="914400" rtl="0" eaLnBrk="1" latinLnBrk="0" hangingPunct="1">
+    <a:lvl6pPr marL="2286000" algn="l" defTabSz="457200" rtl="0" eaLnBrk="1" latinLnBrk="0" hangingPunct="1">
       <a:defRPr sz="1800" kern="1200">
         <a:solidFill>
           <a:schemeClr val="tx1"/>
@@ -75,7 +75,7 @@
         <a:cs typeface="+mn-cs"/>
       </a:defRPr>
     </a:lvl6pPr>
-    <a:lvl7pPr marL="2743200" algn="l" defTabSz="914400" rtl="0" eaLnBrk="1" latinLnBrk="0" hangingPunct="1">
+    <a:lvl7pPr marL="2743200" algn="l" defTabSz="457200" rtl="0" eaLnBrk="1" latinLnBrk="0" hangingPunct="1">
       <a:defRPr sz="1800" kern="1200">
         <a:solidFill>
           <a:schemeClr val="tx1"/>
@@ -85,7 +85,7 @@
         <a:cs typeface="+mn-cs"/>
       </a:defRPr>
     </a:lvl7pPr>
-    <a:lvl8pPr marL="3200400" algn="l" defTabSz="914400" rtl="0" eaLnBrk="1" latinLnBrk="0" hangingPunct="1">
+    <a:lvl8pPr marL="3200400" algn="l" defTabSz="457200" rtl="0" eaLnBrk="1" latinLnBrk="0" hangingPunct="1">
       <a:defRPr sz="1800" kern="1200">
         <a:solidFill>
           <a:schemeClr val="tx1"/>
@@ -95,7 +95,7 @@
         <a:cs typeface="+mn-cs"/>
       </a:defRPr>
     </a:lvl8pPr>
-    <a:lvl9pPr marL="3657600" algn="l" defTabSz="914400" rtl="0" eaLnBrk="1" latinLnBrk="0" hangingPunct="1">
+    <a:lvl9pPr marL="3657600" algn="l" defTabSz="457200" rtl="0" eaLnBrk="1" latinLnBrk="0" hangingPunct="1">
       <a:defRPr sz="1800" kern="1200">
         <a:solidFill>
           <a:schemeClr val="tx1"/>
@@ -133,13 +133,7 @@
       </p:grpSpPr>
       <p:sp>
         <p:nvSpPr>
-          <p:cNvPr id="2" name="Titel 1">
-            <a:extLst>
-              <a:ext uri="{FF2B5EF4-FFF2-40B4-BE49-F238E27FC236}">
-                <a16:creationId xmlns:a16="http://schemas.microsoft.com/office/drawing/2014/main" id="{AE3577BC-36F7-420F-9EB0-D4CB3BCBC269}"/>
-              </a:ext>
-            </a:extLst>
-          </p:cNvPr>
+          <p:cNvPr id="2" name="Title 1"/>
           <p:cNvSpPr>
             <a:spLocks noGrp="1"/>
           </p:cNvSpPr>
@@ -149,15 +143,15 @@
         </p:nvSpPr>
         <p:spPr>
           <a:xfrm>
-            <a:off x="1524000" y="1122363"/>
-            <a:ext cx="9144000" cy="2387600"/>
+            <a:off x="514350" y="1621191"/>
+            <a:ext cx="5829300" cy="3448756"/>
           </a:xfrm>
         </p:spPr>
         <p:txBody>
           <a:bodyPr anchor="b"/>
           <a:lstStyle>
             <a:lvl1pPr algn="ctr">
-              <a:defRPr sz="6000"/>
+              <a:defRPr sz="4500"/>
             </a:lvl1pPr>
           </a:lstStyle>
           <a:p>
@@ -165,19 +159,13 @@
               <a:rPr lang="de-DE"/>
               <a:t>Mastertitelformat bearbeiten</a:t>
             </a:r>
-            <a:endParaRPr lang="en-US"/>
-          </a:p>
-        </p:txBody>
-      </p:sp>
-      <p:sp>
-        <p:nvSpPr>
-          <p:cNvPr id="3" name="Untertitel 2">
-            <a:extLst>
-              <a:ext uri="{FF2B5EF4-FFF2-40B4-BE49-F238E27FC236}">
-                <a16:creationId xmlns:a16="http://schemas.microsoft.com/office/drawing/2014/main" id="{8A20A5CC-FD93-C4E3-5215-57BDEBD260E8}"/>
-              </a:ext>
-            </a:extLst>
-          </p:cNvPr>
+            <a:endParaRPr lang="en-US" dirty="0"/>
+          </a:p>
+        </p:txBody>
+      </p:sp>
+      <p:sp>
+        <p:nvSpPr>
+          <p:cNvPr id="3" name="Subtitle 2"/>
           <p:cNvSpPr>
             <a:spLocks noGrp="1"/>
           </p:cNvSpPr>
@@ -187,8 +175,8 @@
         </p:nvSpPr>
         <p:spPr>
           <a:xfrm>
-            <a:off x="1524000" y="3602038"/>
-            <a:ext cx="9144000" cy="1655762"/>
+            <a:off x="857250" y="5202944"/>
+            <a:ext cx="5143500" cy="2391656"/>
           </a:xfrm>
         </p:spPr>
         <p:txBody>
@@ -196,39 +184,39 @@
           <a:lstStyle>
             <a:lvl1pPr marL="0" indent="0" algn="ctr">
               <a:buNone/>
-              <a:defRPr sz="2400"/>
+              <a:defRPr sz="1800"/>
             </a:lvl1pPr>
-            <a:lvl2pPr marL="457200" indent="0" algn="ctr">
-              <a:buNone/>
-              <a:defRPr sz="2000"/>
+            <a:lvl2pPr marL="342900" indent="0" algn="ctr">
+              <a:buNone/>
+              <a:defRPr sz="1500"/>
             </a:lvl2pPr>
-            <a:lvl3pPr marL="914400" indent="0" algn="ctr">
-              <a:buNone/>
-              <a:defRPr sz="1800"/>
+            <a:lvl3pPr marL="685800" indent="0" algn="ctr">
+              <a:buNone/>
+              <a:defRPr sz="1350"/>
             </a:lvl3pPr>
-            <a:lvl4pPr marL="1371600" indent="0" algn="ctr">
-              <a:buNone/>
-              <a:defRPr sz="1600"/>
+            <a:lvl4pPr marL="1028700" indent="0" algn="ctr">
+              <a:buNone/>
+              <a:defRPr sz="1200"/>
             </a:lvl4pPr>
-            <a:lvl5pPr marL="1828800" indent="0" algn="ctr">
-              <a:buNone/>
-              <a:defRPr sz="1600"/>
+            <a:lvl5pPr marL="1371600" indent="0" algn="ctr">
+              <a:buNone/>
+              <a:defRPr sz="1200"/>
             </a:lvl5pPr>
-            <a:lvl6pPr marL="2286000" indent="0" algn="ctr">
-              <a:buNone/>
-              <a:defRPr sz="1600"/>
+            <a:lvl6pPr marL="1714500" indent="0" algn="ctr">
+              <a:buNone/>
+              <a:defRPr sz="1200"/>
             </a:lvl6pPr>
-            <a:lvl7pPr marL="2743200" indent="0" algn="ctr">
-              <a:buNone/>
-              <a:defRPr sz="1600"/>
+            <a:lvl7pPr marL="2057400" indent="0" algn="ctr">
+              <a:buNone/>
+              <a:defRPr sz="1200"/>
             </a:lvl7pPr>
-            <a:lvl8pPr marL="3200400" indent="0" algn="ctr">
-              <a:buNone/>
-              <a:defRPr sz="1600"/>
+            <a:lvl8pPr marL="2400300" indent="0" algn="ctr">
+              <a:buNone/>
+              <a:defRPr sz="1200"/>
             </a:lvl8pPr>
-            <a:lvl9pPr marL="3657600" indent="0" algn="ctr">
-              <a:buNone/>
-              <a:defRPr sz="1600"/>
+            <a:lvl9pPr marL="2743200" indent="0" algn="ctr">
+              <a:buNone/>
+              <a:defRPr sz="1200"/>
             </a:lvl9pPr>
           </a:lstStyle>
           <a:p>
@@ -236,19 +224,13 @@
               <a:rPr lang="de-DE"/>
               <a:t>Master-Untertitelformat bearbeiten</a:t>
             </a:r>
-            <a:endParaRPr lang="en-US"/>
-          </a:p>
-        </p:txBody>
-      </p:sp>
-      <p:sp>
-        <p:nvSpPr>
-          <p:cNvPr id="4" name="Datumsplatzhalter 3">
-            <a:extLst>
-              <a:ext uri="{FF2B5EF4-FFF2-40B4-BE49-F238E27FC236}">
-                <a16:creationId xmlns:a16="http://schemas.microsoft.com/office/drawing/2014/main" id="{8DD91881-5A65-8433-A105-01C7E6ED0BCF}"/>
-              </a:ext>
-            </a:extLst>
-          </p:cNvPr>
+            <a:endParaRPr lang="en-US" dirty="0"/>
+          </a:p>
+        </p:txBody>
+      </p:sp>
+      <p:sp>
+        <p:nvSpPr>
+          <p:cNvPr id="4" name="Date Placeholder 3"/>
           <p:cNvSpPr>
             <a:spLocks noGrp="1"/>
           </p:cNvSpPr>
@@ -263,7 +245,7 @@
           <a:p>
             <a:fld id="{51E51E49-77BA-4FD5-BB46-972D51D76856}" type="datetimeFigureOut">
               <a:rPr lang="en-US" smtClean="0"/>
-              <a:t>8/5/2025</a:t>
+              <a:t>8/6/2025</a:t>
             </a:fld>
             <a:endParaRPr lang="en-US"/>
           </a:p>
@@ -271,13 +253,7 @@
       </p:sp>
       <p:sp>
         <p:nvSpPr>
-          <p:cNvPr id="5" name="Fußzeilenplatzhalter 4">
-            <a:extLst>
-              <a:ext uri="{FF2B5EF4-FFF2-40B4-BE49-F238E27FC236}">
-                <a16:creationId xmlns:a16="http://schemas.microsoft.com/office/drawing/2014/main" id="{31F295BE-1775-C944-6B17-2135D467EB40}"/>
-              </a:ext>
-            </a:extLst>
-          </p:cNvPr>
+          <p:cNvPr id="5" name="Footer Placeholder 4"/>
           <p:cNvSpPr>
             <a:spLocks noGrp="1"/>
           </p:cNvSpPr>
@@ -296,13 +272,7 @@
       </p:sp>
       <p:sp>
         <p:nvSpPr>
-          <p:cNvPr id="6" name="Foliennummernplatzhalter 5">
-            <a:extLst>
-              <a:ext uri="{FF2B5EF4-FFF2-40B4-BE49-F238E27FC236}">
-                <a16:creationId xmlns:a16="http://schemas.microsoft.com/office/drawing/2014/main" id="{3B4E6D0E-2302-1673-813C-123844FCAD3D}"/>
-              </a:ext>
-            </a:extLst>
-          </p:cNvPr>
+          <p:cNvPr id="6" name="Slide Number Placeholder 5"/>
           <p:cNvSpPr>
             <a:spLocks noGrp="1"/>
           </p:cNvSpPr>
@@ -326,7 +296,7 @@
     </p:spTree>
     <p:extLst>
       <p:ext uri="{BB962C8B-B14F-4D97-AF65-F5344CB8AC3E}">
-        <p14:creationId xmlns:p14="http://schemas.microsoft.com/office/powerpoint/2010/main" val="3337796080"/>
+        <p14:creationId xmlns:p14="http://schemas.microsoft.com/office/powerpoint/2010/main" val="3094489180"/>
       </p:ext>
     </p:extLst>
   </p:cSld>
@@ -355,13 +325,7 @@
       </p:grpSpPr>
       <p:sp>
         <p:nvSpPr>
-          <p:cNvPr id="2" name="Titel 1">
-            <a:extLst>
-              <a:ext uri="{FF2B5EF4-FFF2-40B4-BE49-F238E27FC236}">
-                <a16:creationId xmlns:a16="http://schemas.microsoft.com/office/drawing/2014/main" id="{9A1D157F-4282-63A7-07F0-B021A1141A65}"/>
-              </a:ext>
-            </a:extLst>
-          </p:cNvPr>
+          <p:cNvPr id="2" name="Title 1"/>
           <p:cNvSpPr>
             <a:spLocks noGrp="1"/>
           </p:cNvSpPr>
@@ -378,19 +342,13 @@
               <a:rPr lang="de-DE"/>
               <a:t>Mastertitelformat bearbeiten</a:t>
             </a:r>
-            <a:endParaRPr lang="en-US"/>
-          </a:p>
-        </p:txBody>
-      </p:sp>
-      <p:sp>
-        <p:nvSpPr>
-          <p:cNvPr id="3" name="Vertikaler Textplatzhalter 2">
-            <a:extLst>
-              <a:ext uri="{FF2B5EF4-FFF2-40B4-BE49-F238E27FC236}">
-                <a16:creationId xmlns:a16="http://schemas.microsoft.com/office/drawing/2014/main" id="{DD929A5F-7C78-D1F0-917D-088E5E462B3E}"/>
-              </a:ext>
-            </a:extLst>
-          </p:cNvPr>
+            <a:endParaRPr lang="en-US" dirty="0"/>
+          </a:p>
+        </p:txBody>
+      </p:sp>
+      <p:sp>
+        <p:nvSpPr>
+          <p:cNvPr id="3" name="Vertical Text Placeholder 2"/>
           <p:cNvSpPr>
             <a:spLocks noGrp="1"/>
           </p:cNvSpPr>
@@ -436,19 +394,13 @@
               <a:rPr lang="de-DE"/>
               <a:t>Fünfte Ebene</a:t>
             </a:r>
-            <a:endParaRPr lang="en-US"/>
-          </a:p>
-        </p:txBody>
-      </p:sp>
-      <p:sp>
-        <p:nvSpPr>
-          <p:cNvPr id="4" name="Datumsplatzhalter 3">
-            <a:extLst>
-              <a:ext uri="{FF2B5EF4-FFF2-40B4-BE49-F238E27FC236}">
-                <a16:creationId xmlns:a16="http://schemas.microsoft.com/office/drawing/2014/main" id="{807E352E-97E7-E928-095E-6B00BC3F8BB2}"/>
-              </a:ext>
-            </a:extLst>
-          </p:cNvPr>
+            <a:endParaRPr lang="en-US" dirty="0"/>
+          </a:p>
+        </p:txBody>
+      </p:sp>
+      <p:sp>
+        <p:nvSpPr>
+          <p:cNvPr id="4" name="Date Placeholder 3"/>
           <p:cNvSpPr>
             <a:spLocks noGrp="1"/>
           </p:cNvSpPr>
@@ -463,7 +415,7 @@
           <a:p>
             <a:fld id="{51E51E49-77BA-4FD5-BB46-972D51D76856}" type="datetimeFigureOut">
               <a:rPr lang="en-US" smtClean="0"/>
-              <a:t>8/5/2025</a:t>
+              <a:t>8/6/2025</a:t>
             </a:fld>
             <a:endParaRPr lang="en-US"/>
           </a:p>
@@ -471,13 +423,7 @@
       </p:sp>
       <p:sp>
         <p:nvSpPr>
-          <p:cNvPr id="5" name="Fußzeilenplatzhalter 4">
-            <a:extLst>
-              <a:ext uri="{FF2B5EF4-FFF2-40B4-BE49-F238E27FC236}">
-                <a16:creationId xmlns:a16="http://schemas.microsoft.com/office/drawing/2014/main" id="{FA0E895E-025F-022E-9F35-429B3D12E047}"/>
-              </a:ext>
-            </a:extLst>
-          </p:cNvPr>
+          <p:cNvPr id="5" name="Footer Placeholder 4"/>
           <p:cNvSpPr>
             <a:spLocks noGrp="1"/>
           </p:cNvSpPr>
@@ -496,13 +442,7 @@
       </p:sp>
       <p:sp>
         <p:nvSpPr>
-          <p:cNvPr id="6" name="Foliennummernplatzhalter 5">
-            <a:extLst>
-              <a:ext uri="{FF2B5EF4-FFF2-40B4-BE49-F238E27FC236}">
-                <a16:creationId xmlns:a16="http://schemas.microsoft.com/office/drawing/2014/main" id="{E6F72754-E663-5CB0-6919-5F2F3FBCFD6B}"/>
-              </a:ext>
-            </a:extLst>
-          </p:cNvPr>
+          <p:cNvPr id="6" name="Slide Number Placeholder 5"/>
           <p:cNvSpPr>
             <a:spLocks noGrp="1"/>
           </p:cNvSpPr>
@@ -526,7 +466,7 @@
     </p:spTree>
     <p:extLst>
       <p:ext uri="{BB962C8B-B14F-4D97-AF65-F5344CB8AC3E}">
-        <p14:creationId xmlns:p14="http://schemas.microsoft.com/office/powerpoint/2010/main" val="4048242261"/>
+        <p14:creationId xmlns:p14="http://schemas.microsoft.com/office/powerpoint/2010/main" val="2458824183"/>
       </p:ext>
     </p:extLst>
   </p:cSld>
@@ -555,13 +495,7 @@
       </p:grpSpPr>
       <p:sp>
         <p:nvSpPr>
-          <p:cNvPr id="2" name="Vertikaler Titel 1">
-            <a:extLst>
-              <a:ext uri="{FF2B5EF4-FFF2-40B4-BE49-F238E27FC236}">
-                <a16:creationId xmlns:a16="http://schemas.microsoft.com/office/drawing/2014/main" id="{910E595F-F4C7-194E-0273-BF110961CE12}"/>
-              </a:ext>
-            </a:extLst>
-          </p:cNvPr>
+          <p:cNvPr id="2" name="Vertical Title 1"/>
           <p:cNvSpPr>
             <a:spLocks noGrp="1"/>
           </p:cNvSpPr>
@@ -571,8 +505,8 @@
         </p:nvSpPr>
         <p:spPr>
           <a:xfrm>
-            <a:off x="8724900" y="365125"/>
-            <a:ext cx="2628900" cy="5811838"/>
+            <a:off x="4907757" y="527403"/>
+            <a:ext cx="1478756" cy="8394877"/>
           </a:xfrm>
         </p:spPr>
         <p:txBody>
@@ -583,19 +517,13 @@
               <a:rPr lang="de-DE"/>
               <a:t>Mastertitelformat bearbeiten</a:t>
             </a:r>
-            <a:endParaRPr lang="en-US"/>
-          </a:p>
-        </p:txBody>
-      </p:sp>
-      <p:sp>
-        <p:nvSpPr>
-          <p:cNvPr id="3" name="Vertikaler Textplatzhalter 2">
-            <a:extLst>
-              <a:ext uri="{FF2B5EF4-FFF2-40B4-BE49-F238E27FC236}">
-                <a16:creationId xmlns:a16="http://schemas.microsoft.com/office/drawing/2014/main" id="{C555D51E-F29A-24E7-0E75-D6136076784B}"/>
-              </a:ext>
-            </a:extLst>
-          </p:cNvPr>
+            <a:endParaRPr lang="en-US" dirty="0"/>
+          </a:p>
+        </p:txBody>
+      </p:sp>
+      <p:sp>
+        <p:nvSpPr>
+          <p:cNvPr id="3" name="Vertical Text Placeholder 2"/>
           <p:cNvSpPr>
             <a:spLocks noGrp="1"/>
           </p:cNvSpPr>
@@ -605,8 +533,8 @@
         </p:nvSpPr>
         <p:spPr>
           <a:xfrm>
-            <a:off x="838200" y="365125"/>
-            <a:ext cx="7734300" cy="5811838"/>
+            <a:off x="471488" y="527403"/>
+            <a:ext cx="4350544" cy="8394877"/>
           </a:xfrm>
         </p:spPr>
         <p:txBody>
@@ -646,19 +574,13 @@
               <a:rPr lang="de-DE"/>
               <a:t>Fünfte Ebene</a:t>
             </a:r>
-            <a:endParaRPr lang="en-US"/>
-          </a:p>
-        </p:txBody>
-      </p:sp>
-      <p:sp>
-        <p:nvSpPr>
-          <p:cNvPr id="4" name="Datumsplatzhalter 3">
-            <a:extLst>
-              <a:ext uri="{FF2B5EF4-FFF2-40B4-BE49-F238E27FC236}">
-                <a16:creationId xmlns:a16="http://schemas.microsoft.com/office/drawing/2014/main" id="{3290BF4F-AF72-ADB2-6003-C6C900C0B6C5}"/>
-              </a:ext>
-            </a:extLst>
-          </p:cNvPr>
+            <a:endParaRPr lang="en-US" dirty="0"/>
+          </a:p>
+        </p:txBody>
+      </p:sp>
+      <p:sp>
+        <p:nvSpPr>
+          <p:cNvPr id="4" name="Date Placeholder 3"/>
           <p:cNvSpPr>
             <a:spLocks noGrp="1"/>
           </p:cNvSpPr>
@@ -673,7 +595,7 @@
           <a:p>
             <a:fld id="{51E51E49-77BA-4FD5-BB46-972D51D76856}" type="datetimeFigureOut">
               <a:rPr lang="en-US" smtClean="0"/>
-              <a:t>8/5/2025</a:t>
+              <a:t>8/6/2025</a:t>
             </a:fld>
             <a:endParaRPr lang="en-US"/>
           </a:p>
@@ -681,13 +603,7 @@
       </p:sp>
       <p:sp>
         <p:nvSpPr>
-          <p:cNvPr id="5" name="Fußzeilenplatzhalter 4">
-            <a:extLst>
-              <a:ext uri="{FF2B5EF4-FFF2-40B4-BE49-F238E27FC236}">
-                <a16:creationId xmlns:a16="http://schemas.microsoft.com/office/drawing/2014/main" id="{D7C9A217-82B2-B9A1-70F4-35CEA079FC23}"/>
-              </a:ext>
-            </a:extLst>
-          </p:cNvPr>
+          <p:cNvPr id="5" name="Footer Placeholder 4"/>
           <p:cNvSpPr>
             <a:spLocks noGrp="1"/>
           </p:cNvSpPr>
@@ -706,13 +622,7 @@
       </p:sp>
       <p:sp>
         <p:nvSpPr>
-          <p:cNvPr id="6" name="Foliennummernplatzhalter 5">
-            <a:extLst>
-              <a:ext uri="{FF2B5EF4-FFF2-40B4-BE49-F238E27FC236}">
-                <a16:creationId xmlns:a16="http://schemas.microsoft.com/office/drawing/2014/main" id="{A906AADA-4C5E-5C9D-2F9C-E2CEE459085D}"/>
-              </a:ext>
-            </a:extLst>
-          </p:cNvPr>
+          <p:cNvPr id="6" name="Slide Number Placeholder 5"/>
           <p:cNvSpPr>
             <a:spLocks noGrp="1"/>
           </p:cNvSpPr>
@@ -736,7 +646,7 @@
     </p:spTree>
     <p:extLst>
       <p:ext uri="{BB962C8B-B14F-4D97-AF65-F5344CB8AC3E}">
-        <p14:creationId xmlns:p14="http://schemas.microsoft.com/office/powerpoint/2010/main" val="548655418"/>
+        <p14:creationId xmlns:p14="http://schemas.microsoft.com/office/powerpoint/2010/main" val="3435187308"/>
       </p:ext>
     </p:extLst>
   </p:cSld>
@@ -765,13 +675,7 @@
       </p:grpSpPr>
       <p:sp>
         <p:nvSpPr>
-          <p:cNvPr id="2" name="Titel 1">
-            <a:extLst>
-              <a:ext uri="{FF2B5EF4-FFF2-40B4-BE49-F238E27FC236}">
-                <a16:creationId xmlns:a16="http://schemas.microsoft.com/office/drawing/2014/main" id="{19C36AA7-C49A-F767-66FA-A44CB7F4CC66}"/>
-              </a:ext>
-            </a:extLst>
-          </p:cNvPr>
+          <p:cNvPr id="2" name="Title 1"/>
           <p:cNvSpPr>
             <a:spLocks noGrp="1"/>
           </p:cNvSpPr>
@@ -788,19 +692,13 @@
               <a:rPr lang="de-DE"/>
               <a:t>Mastertitelformat bearbeiten</a:t>
             </a:r>
-            <a:endParaRPr lang="en-US"/>
-          </a:p>
-        </p:txBody>
-      </p:sp>
-      <p:sp>
-        <p:nvSpPr>
-          <p:cNvPr id="3" name="Inhaltsplatzhalter 2">
-            <a:extLst>
-              <a:ext uri="{FF2B5EF4-FFF2-40B4-BE49-F238E27FC236}">
-                <a16:creationId xmlns:a16="http://schemas.microsoft.com/office/drawing/2014/main" id="{42FF05D8-477E-6902-264A-C263DC682940}"/>
-              </a:ext>
-            </a:extLst>
-          </p:cNvPr>
+            <a:endParaRPr lang="en-US" dirty="0"/>
+          </a:p>
+        </p:txBody>
+      </p:sp>
+      <p:sp>
+        <p:nvSpPr>
+          <p:cNvPr id="3" name="Content Placeholder 2"/>
           <p:cNvSpPr>
             <a:spLocks noGrp="1"/>
           </p:cNvSpPr>
@@ -846,19 +744,13 @@
               <a:rPr lang="de-DE"/>
               <a:t>Fünfte Ebene</a:t>
             </a:r>
-            <a:endParaRPr lang="en-US"/>
-          </a:p>
-        </p:txBody>
-      </p:sp>
-      <p:sp>
-        <p:nvSpPr>
-          <p:cNvPr id="4" name="Datumsplatzhalter 3">
-            <a:extLst>
-              <a:ext uri="{FF2B5EF4-FFF2-40B4-BE49-F238E27FC236}">
-                <a16:creationId xmlns:a16="http://schemas.microsoft.com/office/drawing/2014/main" id="{F07DD837-31C7-33B4-8BB0-F063B763F2F3}"/>
-              </a:ext>
-            </a:extLst>
-          </p:cNvPr>
+            <a:endParaRPr lang="en-US" dirty="0"/>
+          </a:p>
+        </p:txBody>
+      </p:sp>
+      <p:sp>
+        <p:nvSpPr>
+          <p:cNvPr id="4" name="Date Placeholder 3"/>
           <p:cNvSpPr>
             <a:spLocks noGrp="1"/>
           </p:cNvSpPr>
@@ -873,7 +765,7 @@
           <a:p>
             <a:fld id="{51E51E49-77BA-4FD5-BB46-972D51D76856}" type="datetimeFigureOut">
               <a:rPr lang="en-US" smtClean="0"/>
-              <a:t>8/5/2025</a:t>
+              <a:t>8/6/2025</a:t>
             </a:fld>
             <a:endParaRPr lang="en-US"/>
           </a:p>
@@ -881,13 +773,7 @@
       </p:sp>
       <p:sp>
         <p:nvSpPr>
-          <p:cNvPr id="5" name="Fußzeilenplatzhalter 4">
-            <a:extLst>
-              <a:ext uri="{FF2B5EF4-FFF2-40B4-BE49-F238E27FC236}">
-                <a16:creationId xmlns:a16="http://schemas.microsoft.com/office/drawing/2014/main" id="{1B44D01C-CB03-33CA-4F70-FC380E10A381}"/>
-              </a:ext>
-            </a:extLst>
-          </p:cNvPr>
+          <p:cNvPr id="5" name="Footer Placeholder 4"/>
           <p:cNvSpPr>
             <a:spLocks noGrp="1"/>
           </p:cNvSpPr>
@@ -906,13 +792,7 @@
       </p:sp>
       <p:sp>
         <p:nvSpPr>
-          <p:cNvPr id="6" name="Foliennummernplatzhalter 5">
-            <a:extLst>
-              <a:ext uri="{FF2B5EF4-FFF2-40B4-BE49-F238E27FC236}">
-                <a16:creationId xmlns:a16="http://schemas.microsoft.com/office/drawing/2014/main" id="{CE59C4F1-9920-B77B-D91F-AD7335FF04A5}"/>
-              </a:ext>
-            </a:extLst>
-          </p:cNvPr>
+          <p:cNvPr id="6" name="Slide Number Placeholder 5"/>
           <p:cNvSpPr>
             <a:spLocks noGrp="1"/>
           </p:cNvSpPr>
@@ -936,7 +816,7 @@
     </p:spTree>
     <p:extLst>
       <p:ext uri="{BB962C8B-B14F-4D97-AF65-F5344CB8AC3E}">
-        <p14:creationId xmlns:p14="http://schemas.microsoft.com/office/powerpoint/2010/main" val="1780613772"/>
+        <p14:creationId xmlns:p14="http://schemas.microsoft.com/office/powerpoint/2010/main" val="3454411511"/>
       </p:ext>
     </p:extLst>
   </p:cSld>
@@ -965,13 +845,7 @@
       </p:grpSpPr>
       <p:sp>
         <p:nvSpPr>
-          <p:cNvPr id="2" name="Titel 1">
-            <a:extLst>
-              <a:ext uri="{FF2B5EF4-FFF2-40B4-BE49-F238E27FC236}">
-                <a16:creationId xmlns:a16="http://schemas.microsoft.com/office/drawing/2014/main" id="{D235179F-F158-9A4E-DC88-5F1423978F3F}"/>
-              </a:ext>
-            </a:extLst>
-          </p:cNvPr>
+          <p:cNvPr id="2" name="Title 1"/>
           <p:cNvSpPr>
             <a:spLocks noGrp="1"/>
           </p:cNvSpPr>
@@ -981,15 +855,15 @@
         </p:nvSpPr>
         <p:spPr>
           <a:xfrm>
-            <a:off x="831850" y="1709738"/>
-            <a:ext cx="10515600" cy="2852737"/>
+            <a:off x="467916" y="2469624"/>
+            <a:ext cx="5915025" cy="4120620"/>
           </a:xfrm>
         </p:spPr>
         <p:txBody>
           <a:bodyPr anchor="b"/>
           <a:lstStyle>
             <a:lvl1pPr>
-              <a:defRPr sz="6000"/>
+              <a:defRPr sz="4500"/>
             </a:lvl1pPr>
           </a:lstStyle>
           <a:p>
@@ -997,19 +871,13 @@
               <a:rPr lang="de-DE"/>
               <a:t>Mastertitelformat bearbeiten</a:t>
             </a:r>
-            <a:endParaRPr lang="en-US"/>
-          </a:p>
-        </p:txBody>
-      </p:sp>
-      <p:sp>
-        <p:nvSpPr>
-          <p:cNvPr id="3" name="Textplatzhalter 2">
-            <a:extLst>
-              <a:ext uri="{FF2B5EF4-FFF2-40B4-BE49-F238E27FC236}">
-                <a16:creationId xmlns:a16="http://schemas.microsoft.com/office/drawing/2014/main" id="{7D4803AE-260F-CEB8-A00F-1197C2C082BC}"/>
-              </a:ext>
-            </a:extLst>
-          </p:cNvPr>
+            <a:endParaRPr lang="en-US" dirty="0"/>
+          </a:p>
+        </p:txBody>
+      </p:sp>
+      <p:sp>
+        <p:nvSpPr>
+          <p:cNvPr id="3" name="Text Placeholder 2"/>
           <p:cNvSpPr>
             <a:spLocks noGrp="1"/>
           </p:cNvSpPr>
@@ -1019,8 +887,8 @@
         </p:nvSpPr>
         <p:spPr>
           <a:xfrm>
-            <a:off x="831850" y="4589463"/>
-            <a:ext cx="10515600" cy="1500187"/>
+            <a:off x="467916" y="6629226"/>
+            <a:ext cx="5915025" cy="2166937"/>
           </a:xfrm>
         </p:spPr>
         <p:txBody>
@@ -1028,7 +896,7 @@
           <a:lstStyle>
             <a:lvl1pPr marL="0" indent="0">
               <a:buNone/>
-              <a:defRPr sz="2400">
+              <a:defRPr sz="1800">
                 <a:solidFill>
                   <a:schemeClr val="tx1">
                     <a:tint val="82000"/>
@@ -1036,9 +904,9 @@
                 </a:solidFill>
               </a:defRPr>
             </a:lvl1pPr>
-            <a:lvl2pPr marL="457200" indent="0">
-              <a:buNone/>
-              <a:defRPr sz="2000">
+            <a:lvl2pPr marL="342900" indent="0">
+              <a:buNone/>
+              <a:defRPr sz="1500">
                 <a:solidFill>
                   <a:schemeClr val="tx1">
                     <a:tint val="82000"/>
@@ -1046,9 +914,9 @@
                 </a:solidFill>
               </a:defRPr>
             </a:lvl2pPr>
-            <a:lvl3pPr marL="914400" indent="0">
-              <a:buNone/>
-              <a:defRPr sz="1800">
+            <a:lvl3pPr marL="685800" indent="0">
+              <a:buNone/>
+              <a:defRPr sz="1350">
                 <a:solidFill>
                   <a:schemeClr val="tx1">
                     <a:tint val="82000"/>
@@ -1056,9 +924,9 @@
                 </a:solidFill>
               </a:defRPr>
             </a:lvl3pPr>
-            <a:lvl4pPr marL="1371600" indent="0">
-              <a:buNone/>
-              <a:defRPr sz="1600">
+            <a:lvl4pPr marL="1028700" indent="0">
+              <a:buNone/>
+              <a:defRPr sz="1200">
                 <a:solidFill>
                   <a:schemeClr val="tx1">
                     <a:tint val="82000"/>
@@ -1066,9 +934,9 @@
                 </a:solidFill>
               </a:defRPr>
             </a:lvl4pPr>
-            <a:lvl5pPr marL="1828800" indent="0">
-              <a:buNone/>
-              <a:defRPr sz="1600">
+            <a:lvl5pPr marL="1371600" indent="0">
+              <a:buNone/>
+              <a:defRPr sz="1200">
                 <a:solidFill>
                   <a:schemeClr val="tx1">
                     <a:tint val="82000"/>
@@ -1076,9 +944,9 @@
                 </a:solidFill>
               </a:defRPr>
             </a:lvl5pPr>
-            <a:lvl6pPr marL="2286000" indent="0">
-              <a:buNone/>
-              <a:defRPr sz="1600">
+            <a:lvl6pPr marL="1714500" indent="0">
+              <a:buNone/>
+              <a:defRPr sz="1200">
                 <a:solidFill>
                   <a:schemeClr val="tx1">
                     <a:tint val="82000"/>
@@ -1086,9 +954,9 @@
                 </a:solidFill>
               </a:defRPr>
             </a:lvl6pPr>
-            <a:lvl7pPr marL="2743200" indent="0">
-              <a:buNone/>
-              <a:defRPr sz="1600">
+            <a:lvl7pPr marL="2057400" indent="0">
+              <a:buNone/>
+              <a:defRPr sz="1200">
                 <a:solidFill>
                   <a:schemeClr val="tx1">
                     <a:tint val="82000"/>
@@ -1096,9 +964,9 @@
                 </a:solidFill>
               </a:defRPr>
             </a:lvl7pPr>
-            <a:lvl8pPr marL="3200400" indent="0">
-              <a:buNone/>
-              <a:defRPr sz="1600">
+            <a:lvl8pPr marL="2400300" indent="0">
+              <a:buNone/>
+              <a:defRPr sz="1200">
                 <a:solidFill>
                   <a:schemeClr val="tx1">
                     <a:tint val="82000"/>
@@ -1106,9 +974,9 @@
                 </a:solidFill>
               </a:defRPr>
             </a:lvl8pPr>
-            <a:lvl9pPr marL="3657600" indent="0">
-              <a:buNone/>
-              <a:defRPr sz="1600">
+            <a:lvl9pPr marL="2743200" indent="0">
+              <a:buNone/>
+              <a:defRPr sz="1200">
                 <a:solidFill>
                   <a:schemeClr val="tx1">
                     <a:tint val="82000"/>
@@ -1128,13 +996,7 @@
       </p:sp>
       <p:sp>
         <p:nvSpPr>
-          <p:cNvPr id="4" name="Datumsplatzhalter 3">
-            <a:extLst>
-              <a:ext uri="{FF2B5EF4-FFF2-40B4-BE49-F238E27FC236}">
-                <a16:creationId xmlns:a16="http://schemas.microsoft.com/office/drawing/2014/main" id="{B4BDAC2A-2C2D-7879-ED9B-F6EA9B721EC6}"/>
-              </a:ext>
-            </a:extLst>
-          </p:cNvPr>
+          <p:cNvPr id="4" name="Date Placeholder 3"/>
           <p:cNvSpPr>
             <a:spLocks noGrp="1"/>
           </p:cNvSpPr>
@@ -1149,7 +1011,7 @@
           <a:p>
             <a:fld id="{51E51E49-77BA-4FD5-BB46-972D51D76856}" type="datetimeFigureOut">
               <a:rPr lang="en-US" smtClean="0"/>
-              <a:t>8/5/2025</a:t>
+              <a:t>8/6/2025</a:t>
             </a:fld>
             <a:endParaRPr lang="en-US"/>
           </a:p>
@@ -1157,13 +1019,7 @@
       </p:sp>
       <p:sp>
         <p:nvSpPr>
-          <p:cNvPr id="5" name="Fußzeilenplatzhalter 4">
-            <a:extLst>
-              <a:ext uri="{FF2B5EF4-FFF2-40B4-BE49-F238E27FC236}">
-                <a16:creationId xmlns:a16="http://schemas.microsoft.com/office/drawing/2014/main" id="{E7E45863-C22A-26B8-4AA3-ADF8D321C4C7}"/>
-              </a:ext>
-            </a:extLst>
-          </p:cNvPr>
+          <p:cNvPr id="5" name="Footer Placeholder 4"/>
           <p:cNvSpPr>
             <a:spLocks noGrp="1"/>
           </p:cNvSpPr>
@@ -1182,13 +1038,7 @@
       </p:sp>
       <p:sp>
         <p:nvSpPr>
-          <p:cNvPr id="6" name="Foliennummernplatzhalter 5">
-            <a:extLst>
-              <a:ext uri="{FF2B5EF4-FFF2-40B4-BE49-F238E27FC236}">
-                <a16:creationId xmlns:a16="http://schemas.microsoft.com/office/drawing/2014/main" id="{3AF4EE7B-59B1-6012-6433-F57DDC518B81}"/>
-              </a:ext>
-            </a:extLst>
-          </p:cNvPr>
+          <p:cNvPr id="6" name="Slide Number Placeholder 5"/>
           <p:cNvSpPr>
             <a:spLocks noGrp="1"/>
           </p:cNvSpPr>
@@ -1212,7 +1062,7 @@
     </p:spTree>
     <p:extLst>
       <p:ext uri="{BB962C8B-B14F-4D97-AF65-F5344CB8AC3E}">
-        <p14:creationId xmlns:p14="http://schemas.microsoft.com/office/powerpoint/2010/main" val="463546732"/>
+        <p14:creationId xmlns:p14="http://schemas.microsoft.com/office/powerpoint/2010/main" val="773959749"/>
       </p:ext>
     </p:extLst>
   </p:cSld>
@@ -1241,13 +1091,7 @@
       </p:grpSpPr>
       <p:sp>
         <p:nvSpPr>
-          <p:cNvPr id="2" name="Titel 1">
-            <a:extLst>
-              <a:ext uri="{FF2B5EF4-FFF2-40B4-BE49-F238E27FC236}">
-                <a16:creationId xmlns:a16="http://schemas.microsoft.com/office/drawing/2014/main" id="{36C79F9B-C85D-0C0B-177D-85A60CE699C1}"/>
-              </a:ext>
-            </a:extLst>
-          </p:cNvPr>
+          <p:cNvPr id="2" name="Title 1"/>
           <p:cNvSpPr>
             <a:spLocks noGrp="1"/>
           </p:cNvSpPr>
@@ -1264,19 +1108,13 @@
               <a:rPr lang="de-DE"/>
               <a:t>Mastertitelformat bearbeiten</a:t>
             </a:r>
-            <a:endParaRPr lang="en-US"/>
-          </a:p>
-        </p:txBody>
-      </p:sp>
-      <p:sp>
-        <p:nvSpPr>
-          <p:cNvPr id="3" name="Inhaltsplatzhalter 2">
-            <a:extLst>
-              <a:ext uri="{FF2B5EF4-FFF2-40B4-BE49-F238E27FC236}">
-                <a16:creationId xmlns:a16="http://schemas.microsoft.com/office/drawing/2014/main" id="{D6B65E26-BD97-0392-A847-01B68FABA7FA}"/>
-              </a:ext>
-            </a:extLst>
-          </p:cNvPr>
+            <a:endParaRPr lang="en-US" dirty="0"/>
+          </a:p>
+        </p:txBody>
+      </p:sp>
+      <p:sp>
+        <p:nvSpPr>
+          <p:cNvPr id="3" name="Content Placeholder 2"/>
           <p:cNvSpPr>
             <a:spLocks noGrp="1"/>
           </p:cNvSpPr>
@@ -1286,8 +1124,8 @@
         </p:nvSpPr>
         <p:spPr>
           <a:xfrm>
-            <a:off x="838200" y="1825625"/>
-            <a:ext cx="5181600" cy="4351338"/>
+            <a:off x="471488" y="2637014"/>
+            <a:ext cx="2914650" cy="6285266"/>
           </a:xfrm>
         </p:spPr>
         <p:txBody>
@@ -1327,19 +1165,13 @@
               <a:rPr lang="de-DE"/>
               <a:t>Fünfte Ebene</a:t>
             </a:r>
-            <a:endParaRPr lang="en-US"/>
-          </a:p>
-        </p:txBody>
-      </p:sp>
-      <p:sp>
-        <p:nvSpPr>
-          <p:cNvPr id="4" name="Inhaltsplatzhalter 3">
-            <a:extLst>
-              <a:ext uri="{FF2B5EF4-FFF2-40B4-BE49-F238E27FC236}">
-                <a16:creationId xmlns:a16="http://schemas.microsoft.com/office/drawing/2014/main" id="{1DB23832-A9F5-85A3-DA2F-00E7516B7E65}"/>
-              </a:ext>
-            </a:extLst>
-          </p:cNvPr>
+            <a:endParaRPr lang="en-US" dirty="0"/>
+          </a:p>
+        </p:txBody>
+      </p:sp>
+      <p:sp>
+        <p:nvSpPr>
+          <p:cNvPr id="4" name="Content Placeholder 3"/>
           <p:cNvSpPr>
             <a:spLocks noGrp="1"/>
           </p:cNvSpPr>
@@ -1349,8 +1181,8 @@
         </p:nvSpPr>
         <p:spPr>
           <a:xfrm>
-            <a:off x="6172200" y="1825625"/>
-            <a:ext cx="5181600" cy="4351338"/>
+            <a:off x="3471863" y="2637014"/>
+            <a:ext cx="2914650" cy="6285266"/>
           </a:xfrm>
         </p:spPr>
         <p:txBody>
@@ -1390,19 +1222,13 @@
               <a:rPr lang="de-DE"/>
               <a:t>Fünfte Ebene</a:t>
             </a:r>
-            <a:endParaRPr lang="en-US"/>
-          </a:p>
-        </p:txBody>
-      </p:sp>
-      <p:sp>
-        <p:nvSpPr>
-          <p:cNvPr id="5" name="Datumsplatzhalter 4">
-            <a:extLst>
-              <a:ext uri="{FF2B5EF4-FFF2-40B4-BE49-F238E27FC236}">
-                <a16:creationId xmlns:a16="http://schemas.microsoft.com/office/drawing/2014/main" id="{239E5410-C1B1-7CB0-94DD-7B93B42B3175}"/>
-              </a:ext>
-            </a:extLst>
-          </p:cNvPr>
+            <a:endParaRPr lang="en-US" dirty="0"/>
+          </a:p>
+        </p:txBody>
+      </p:sp>
+      <p:sp>
+        <p:nvSpPr>
+          <p:cNvPr id="5" name="Date Placeholder 4"/>
           <p:cNvSpPr>
             <a:spLocks noGrp="1"/>
           </p:cNvSpPr>
@@ -1417,7 +1243,7 @@
           <a:p>
             <a:fld id="{51E51E49-77BA-4FD5-BB46-972D51D76856}" type="datetimeFigureOut">
               <a:rPr lang="en-US" smtClean="0"/>
-              <a:t>8/5/2025</a:t>
+              <a:t>8/6/2025</a:t>
             </a:fld>
             <a:endParaRPr lang="en-US"/>
           </a:p>
@@ -1425,13 +1251,7 @@
       </p:sp>
       <p:sp>
         <p:nvSpPr>
-          <p:cNvPr id="6" name="Fußzeilenplatzhalter 5">
-            <a:extLst>
-              <a:ext uri="{FF2B5EF4-FFF2-40B4-BE49-F238E27FC236}">
-                <a16:creationId xmlns:a16="http://schemas.microsoft.com/office/drawing/2014/main" id="{15D5D215-45BC-0315-2D78-5F79656428F4}"/>
-              </a:ext>
-            </a:extLst>
-          </p:cNvPr>
+          <p:cNvPr id="6" name="Footer Placeholder 5"/>
           <p:cNvSpPr>
             <a:spLocks noGrp="1"/>
           </p:cNvSpPr>
@@ -1450,13 +1270,7 @@
       </p:sp>
       <p:sp>
         <p:nvSpPr>
-          <p:cNvPr id="7" name="Foliennummernplatzhalter 6">
-            <a:extLst>
-              <a:ext uri="{FF2B5EF4-FFF2-40B4-BE49-F238E27FC236}">
-                <a16:creationId xmlns:a16="http://schemas.microsoft.com/office/drawing/2014/main" id="{2BB7D708-40DC-CFE7-FB10-86CE151EDBD0}"/>
-              </a:ext>
-            </a:extLst>
-          </p:cNvPr>
+          <p:cNvPr id="7" name="Slide Number Placeholder 6"/>
           <p:cNvSpPr>
             <a:spLocks noGrp="1"/>
           </p:cNvSpPr>
@@ -1480,7 +1294,7 @@
     </p:spTree>
     <p:extLst>
       <p:ext uri="{BB962C8B-B14F-4D97-AF65-F5344CB8AC3E}">
-        <p14:creationId xmlns:p14="http://schemas.microsoft.com/office/powerpoint/2010/main" val="3910108706"/>
+        <p14:creationId xmlns:p14="http://schemas.microsoft.com/office/powerpoint/2010/main" val="1521820423"/>
       </p:ext>
     </p:extLst>
   </p:cSld>
@@ -1509,13 +1323,7 @@
       </p:grpSpPr>
       <p:sp>
         <p:nvSpPr>
-          <p:cNvPr id="2" name="Titel 1">
-            <a:extLst>
-              <a:ext uri="{FF2B5EF4-FFF2-40B4-BE49-F238E27FC236}">
-                <a16:creationId xmlns:a16="http://schemas.microsoft.com/office/drawing/2014/main" id="{03995616-BF47-BC72-2570-095A7F2D50BB}"/>
-              </a:ext>
-            </a:extLst>
-          </p:cNvPr>
+          <p:cNvPr id="2" name="Title 1"/>
           <p:cNvSpPr>
             <a:spLocks noGrp="1"/>
           </p:cNvSpPr>
@@ -1525,8 +1333,8 @@
         </p:nvSpPr>
         <p:spPr>
           <a:xfrm>
-            <a:off x="839788" y="365125"/>
-            <a:ext cx="10515600" cy="1325563"/>
+            <a:off x="472381" y="527405"/>
+            <a:ext cx="5915025" cy="1914702"/>
           </a:xfrm>
         </p:spPr>
         <p:txBody>
@@ -1537,19 +1345,13 @@
               <a:rPr lang="de-DE"/>
               <a:t>Mastertitelformat bearbeiten</a:t>
             </a:r>
-            <a:endParaRPr lang="en-US"/>
-          </a:p>
-        </p:txBody>
-      </p:sp>
-      <p:sp>
-        <p:nvSpPr>
-          <p:cNvPr id="3" name="Textplatzhalter 2">
-            <a:extLst>
-              <a:ext uri="{FF2B5EF4-FFF2-40B4-BE49-F238E27FC236}">
-                <a16:creationId xmlns:a16="http://schemas.microsoft.com/office/drawing/2014/main" id="{16507C1F-0BC1-7757-A0F1-1AF630B616C3}"/>
-              </a:ext>
-            </a:extLst>
-          </p:cNvPr>
+            <a:endParaRPr lang="en-US" dirty="0"/>
+          </a:p>
+        </p:txBody>
+      </p:sp>
+      <p:sp>
+        <p:nvSpPr>
+          <p:cNvPr id="3" name="Text Placeholder 2"/>
           <p:cNvSpPr>
             <a:spLocks noGrp="1"/>
           </p:cNvSpPr>
@@ -1559,8 +1361,8 @@
         </p:nvSpPr>
         <p:spPr>
           <a:xfrm>
-            <a:off x="839788" y="1681163"/>
-            <a:ext cx="5157787" cy="823912"/>
+            <a:off x="472381" y="2428347"/>
+            <a:ext cx="2901255" cy="1190095"/>
           </a:xfrm>
         </p:spPr>
         <p:txBody>
@@ -1568,39 +1370,39 @@
           <a:lstStyle>
             <a:lvl1pPr marL="0" indent="0">
               <a:buNone/>
-              <a:defRPr sz="2400" b="1"/>
+              <a:defRPr sz="1800" b="1"/>
             </a:lvl1pPr>
-            <a:lvl2pPr marL="457200" indent="0">
-              <a:buNone/>
-              <a:defRPr sz="2000" b="1"/>
+            <a:lvl2pPr marL="342900" indent="0">
+              <a:buNone/>
+              <a:defRPr sz="1500" b="1"/>
             </a:lvl2pPr>
-            <a:lvl3pPr marL="914400" indent="0">
-              <a:buNone/>
-              <a:defRPr sz="1800" b="1"/>
+            <a:lvl3pPr marL="685800" indent="0">
+              <a:buNone/>
+              <a:defRPr sz="1350" b="1"/>
             </a:lvl3pPr>
-            <a:lvl4pPr marL="1371600" indent="0">
-              <a:buNone/>
-              <a:defRPr sz="1600" b="1"/>
+            <a:lvl4pPr marL="1028700" indent="0">
+              <a:buNone/>
+              <a:defRPr sz="1200" b="1"/>
             </a:lvl4pPr>
-            <a:lvl5pPr marL="1828800" indent="0">
-              <a:buNone/>
-              <a:defRPr sz="1600" b="1"/>
+            <a:lvl5pPr marL="1371600" indent="0">
+              <a:buNone/>
+              <a:defRPr sz="1200" b="1"/>
             </a:lvl5pPr>
-            <a:lvl6pPr marL="2286000" indent="0">
-              <a:buNone/>
-              <a:defRPr sz="1600" b="1"/>
+            <a:lvl6pPr marL="1714500" indent="0">
+              <a:buNone/>
+              <a:defRPr sz="1200" b="1"/>
             </a:lvl6pPr>
-            <a:lvl7pPr marL="2743200" indent="0">
-              <a:buNone/>
-              <a:defRPr sz="1600" b="1"/>
+            <a:lvl7pPr marL="2057400" indent="0">
+              <a:buNone/>
+              <a:defRPr sz="1200" b="1"/>
             </a:lvl7pPr>
-            <a:lvl8pPr marL="3200400" indent="0">
-              <a:buNone/>
-              <a:defRPr sz="1600" b="1"/>
+            <a:lvl8pPr marL="2400300" indent="0">
+              <a:buNone/>
+              <a:defRPr sz="1200" b="1"/>
             </a:lvl8pPr>
-            <a:lvl9pPr marL="3657600" indent="0">
-              <a:buNone/>
-              <a:defRPr sz="1600" b="1"/>
+            <a:lvl9pPr marL="2743200" indent="0">
+              <a:buNone/>
+              <a:defRPr sz="1200" b="1"/>
             </a:lvl9pPr>
           </a:lstStyle>
           <a:p>
@@ -1614,13 +1416,7 @@
       </p:sp>
       <p:sp>
         <p:nvSpPr>
-          <p:cNvPr id="4" name="Inhaltsplatzhalter 3">
-            <a:extLst>
-              <a:ext uri="{FF2B5EF4-FFF2-40B4-BE49-F238E27FC236}">
-                <a16:creationId xmlns:a16="http://schemas.microsoft.com/office/drawing/2014/main" id="{175CA427-B16E-920A-2069-41AC1224CC24}"/>
-              </a:ext>
-            </a:extLst>
-          </p:cNvPr>
+          <p:cNvPr id="4" name="Content Placeholder 3"/>
           <p:cNvSpPr>
             <a:spLocks noGrp="1"/>
           </p:cNvSpPr>
@@ -1630,8 +1426,8 @@
         </p:nvSpPr>
         <p:spPr>
           <a:xfrm>
-            <a:off x="839788" y="2505075"/>
-            <a:ext cx="5157787" cy="3684588"/>
+            <a:off x="472381" y="3618442"/>
+            <a:ext cx="2901255" cy="5322183"/>
           </a:xfrm>
         </p:spPr>
         <p:txBody>
@@ -1671,19 +1467,13 @@
               <a:rPr lang="de-DE"/>
               <a:t>Fünfte Ebene</a:t>
             </a:r>
-            <a:endParaRPr lang="en-US"/>
-          </a:p>
-        </p:txBody>
-      </p:sp>
-      <p:sp>
-        <p:nvSpPr>
-          <p:cNvPr id="5" name="Textplatzhalter 4">
-            <a:extLst>
-              <a:ext uri="{FF2B5EF4-FFF2-40B4-BE49-F238E27FC236}">
-                <a16:creationId xmlns:a16="http://schemas.microsoft.com/office/drawing/2014/main" id="{41505D29-8A38-BF39-0013-BAF10BBB13D9}"/>
-              </a:ext>
-            </a:extLst>
-          </p:cNvPr>
+            <a:endParaRPr lang="en-US" dirty="0"/>
+          </a:p>
+        </p:txBody>
+      </p:sp>
+      <p:sp>
+        <p:nvSpPr>
+          <p:cNvPr id="5" name="Text Placeholder 4"/>
           <p:cNvSpPr>
             <a:spLocks noGrp="1"/>
           </p:cNvSpPr>
@@ -1693,8 +1483,8 @@
         </p:nvSpPr>
         <p:spPr>
           <a:xfrm>
-            <a:off x="6172200" y="1681163"/>
-            <a:ext cx="5183188" cy="823912"/>
+            <a:off x="3471863" y="2428347"/>
+            <a:ext cx="2915543" cy="1190095"/>
           </a:xfrm>
         </p:spPr>
         <p:txBody>
@@ -1702,39 +1492,39 @@
           <a:lstStyle>
             <a:lvl1pPr marL="0" indent="0">
               <a:buNone/>
-              <a:defRPr sz="2400" b="1"/>
+              <a:defRPr sz="1800" b="1"/>
             </a:lvl1pPr>
-            <a:lvl2pPr marL="457200" indent="0">
-              <a:buNone/>
-              <a:defRPr sz="2000" b="1"/>
+            <a:lvl2pPr marL="342900" indent="0">
+              <a:buNone/>
+              <a:defRPr sz="1500" b="1"/>
             </a:lvl2pPr>
-            <a:lvl3pPr marL="914400" indent="0">
-              <a:buNone/>
-              <a:defRPr sz="1800" b="1"/>
+            <a:lvl3pPr marL="685800" indent="0">
+              <a:buNone/>
+              <a:defRPr sz="1350" b="1"/>
             </a:lvl3pPr>
-            <a:lvl4pPr marL="1371600" indent="0">
-              <a:buNone/>
-              <a:defRPr sz="1600" b="1"/>
+            <a:lvl4pPr marL="1028700" indent="0">
+              <a:buNone/>
+              <a:defRPr sz="1200" b="1"/>
             </a:lvl4pPr>
-            <a:lvl5pPr marL="1828800" indent="0">
-              <a:buNone/>
-              <a:defRPr sz="1600" b="1"/>
+            <a:lvl5pPr marL="1371600" indent="0">
+              <a:buNone/>
+              <a:defRPr sz="1200" b="1"/>
             </a:lvl5pPr>
-            <a:lvl6pPr marL="2286000" indent="0">
-              <a:buNone/>
-              <a:defRPr sz="1600" b="1"/>
+            <a:lvl6pPr marL="1714500" indent="0">
+              <a:buNone/>
+              <a:defRPr sz="1200" b="1"/>
             </a:lvl6pPr>
-            <a:lvl7pPr marL="2743200" indent="0">
-              <a:buNone/>
-              <a:defRPr sz="1600" b="1"/>
+            <a:lvl7pPr marL="2057400" indent="0">
+              <a:buNone/>
+              <a:defRPr sz="1200" b="1"/>
             </a:lvl7pPr>
-            <a:lvl8pPr marL="3200400" indent="0">
-              <a:buNone/>
-              <a:defRPr sz="1600" b="1"/>
+            <a:lvl8pPr marL="2400300" indent="0">
+              <a:buNone/>
+              <a:defRPr sz="1200" b="1"/>
             </a:lvl8pPr>
-            <a:lvl9pPr marL="3657600" indent="0">
-              <a:buNone/>
-              <a:defRPr sz="1600" b="1"/>
+            <a:lvl9pPr marL="2743200" indent="0">
+              <a:buNone/>
+              <a:defRPr sz="1200" b="1"/>
             </a:lvl9pPr>
           </a:lstStyle>
           <a:p>
@@ -1748,13 +1538,7 @@
       </p:sp>
       <p:sp>
         <p:nvSpPr>
-          <p:cNvPr id="6" name="Inhaltsplatzhalter 5">
-            <a:extLst>
-              <a:ext uri="{FF2B5EF4-FFF2-40B4-BE49-F238E27FC236}">
-                <a16:creationId xmlns:a16="http://schemas.microsoft.com/office/drawing/2014/main" id="{A5831D9B-0F92-0920-7D26-0A6CEA8ACBE6}"/>
-              </a:ext>
-            </a:extLst>
-          </p:cNvPr>
+          <p:cNvPr id="6" name="Content Placeholder 5"/>
           <p:cNvSpPr>
             <a:spLocks noGrp="1"/>
           </p:cNvSpPr>
@@ -1764,8 +1548,8 @@
         </p:nvSpPr>
         <p:spPr>
           <a:xfrm>
-            <a:off x="6172200" y="2505075"/>
-            <a:ext cx="5183188" cy="3684588"/>
+            <a:off x="3471863" y="3618442"/>
+            <a:ext cx="2915543" cy="5322183"/>
           </a:xfrm>
         </p:spPr>
         <p:txBody>
@@ -1805,19 +1589,13 @@
               <a:rPr lang="de-DE"/>
               <a:t>Fünfte Ebene</a:t>
             </a:r>
-            <a:endParaRPr lang="en-US"/>
-          </a:p>
-        </p:txBody>
-      </p:sp>
-      <p:sp>
-        <p:nvSpPr>
-          <p:cNvPr id="7" name="Datumsplatzhalter 6">
-            <a:extLst>
-              <a:ext uri="{FF2B5EF4-FFF2-40B4-BE49-F238E27FC236}">
-                <a16:creationId xmlns:a16="http://schemas.microsoft.com/office/drawing/2014/main" id="{E13493D0-1F12-0150-E963-9D3613A9D4D1}"/>
-              </a:ext>
-            </a:extLst>
-          </p:cNvPr>
+            <a:endParaRPr lang="en-US" dirty="0"/>
+          </a:p>
+        </p:txBody>
+      </p:sp>
+      <p:sp>
+        <p:nvSpPr>
+          <p:cNvPr id="7" name="Date Placeholder 6"/>
           <p:cNvSpPr>
             <a:spLocks noGrp="1"/>
           </p:cNvSpPr>
@@ -1832,7 +1610,7 @@
           <a:p>
             <a:fld id="{51E51E49-77BA-4FD5-BB46-972D51D76856}" type="datetimeFigureOut">
               <a:rPr lang="en-US" smtClean="0"/>
-              <a:t>8/5/2025</a:t>
+              <a:t>8/6/2025</a:t>
             </a:fld>
             <a:endParaRPr lang="en-US"/>
           </a:p>
@@ -1840,13 +1618,7 @@
       </p:sp>
       <p:sp>
         <p:nvSpPr>
-          <p:cNvPr id="8" name="Fußzeilenplatzhalter 7">
-            <a:extLst>
-              <a:ext uri="{FF2B5EF4-FFF2-40B4-BE49-F238E27FC236}">
-                <a16:creationId xmlns:a16="http://schemas.microsoft.com/office/drawing/2014/main" id="{705B5C8E-F153-B6FA-F978-D4E4FCA23F2F}"/>
-              </a:ext>
-            </a:extLst>
-          </p:cNvPr>
+          <p:cNvPr id="8" name="Footer Placeholder 7"/>
           <p:cNvSpPr>
             <a:spLocks noGrp="1"/>
           </p:cNvSpPr>
@@ -1865,13 +1637,7 @@
       </p:sp>
       <p:sp>
         <p:nvSpPr>
-          <p:cNvPr id="9" name="Foliennummernplatzhalter 8">
-            <a:extLst>
-              <a:ext uri="{FF2B5EF4-FFF2-40B4-BE49-F238E27FC236}">
-                <a16:creationId xmlns:a16="http://schemas.microsoft.com/office/drawing/2014/main" id="{C1BC3BF5-E659-1FBA-4068-217234723C09}"/>
-              </a:ext>
-            </a:extLst>
-          </p:cNvPr>
+          <p:cNvPr id="9" name="Slide Number Placeholder 8"/>
           <p:cNvSpPr>
             <a:spLocks noGrp="1"/>
           </p:cNvSpPr>
@@ -1895,7 +1661,7 @@
     </p:spTree>
     <p:extLst>
       <p:ext uri="{BB962C8B-B14F-4D97-AF65-F5344CB8AC3E}">
-        <p14:creationId xmlns:p14="http://schemas.microsoft.com/office/powerpoint/2010/main" val="1415520781"/>
+        <p14:creationId xmlns:p14="http://schemas.microsoft.com/office/powerpoint/2010/main" val="3550742269"/>
       </p:ext>
     </p:extLst>
   </p:cSld>
@@ -1924,13 +1690,7 @@
       </p:grpSpPr>
       <p:sp>
         <p:nvSpPr>
-          <p:cNvPr id="2" name="Titel 1">
-            <a:extLst>
-              <a:ext uri="{FF2B5EF4-FFF2-40B4-BE49-F238E27FC236}">
-                <a16:creationId xmlns:a16="http://schemas.microsoft.com/office/drawing/2014/main" id="{A86B8F6F-C310-473E-778A-16AE4BB3B566}"/>
-              </a:ext>
-            </a:extLst>
-          </p:cNvPr>
+          <p:cNvPr id="2" name="Title 1"/>
           <p:cNvSpPr>
             <a:spLocks noGrp="1"/>
           </p:cNvSpPr>
@@ -1947,19 +1707,13 @@
               <a:rPr lang="de-DE"/>
               <a:t>Mastertitelformat bearbeiten</a:t>
             </a:r>
-            <a:endParaRPr lang="en-US"/>
-          </a:p>
-        </p:txBody>
-      </p:sp>
-      <p:sp>
-        <p:nvSpPr>
-          <p:cNvPr id="3" name="Datumsplatzhalter 2">
-            <a:extLst>
-              <a:ext uri="{FF2B5EF4-FFF2-40B4-BE49-F238E27FC236}">
-                <a16:creationId xmlns:a16="http://schemas.microsoft.com/office/drawing/2014/main" id="{ACAFBC0B-758F-4A03-EE66-4F73F81F16D9}"/>
-              </a:ext>
-            </a:extLst>
-          </p:cNvPr>
+            <a:endParaRPr lang="en-US" dirty="0"/>
+          </a:p>
+        </p:txBody>
+      </p:sp>
+      <p:sp>
+        <p:nvSpPr>
+          <p:cNvPr id="3" name="Date Placeholder 2"/>
           <p:cNvSpPr>
             <a:spLocks noGrp="1"/>
           </p:cNvSpPr>
@@ -1974,7 +1728,7 @@
           <a:p>
             <a:fld id="{51E51E49-77BA-4FD5-BB46-972D51D76856}" type="datetimeFigureOut">
               <a:rPr lang="en-US" smtClean="0"/>
-              <a:t>8/5/2025</a:t>
+              <a:t>8/6/2025</a:t>
             </a:fld>
             <a:endParaRPr lang="en-US"/>
           </a:p>
@@ -1982,13 +1736,7 @@
       </p:sp>
       <p:sp>
         <p:nvSpPr>
-          <p:cNvPr id="4" name="Fußzeilenplatzhalter 3">
-            <a:extLst>
-              <a:ext uri="{FF2B5EF4-FFF2-40B4-BE49-F238E27FC236}">
-                <a16:creationId xmlns:a16="http://schemas.microsoft.com/office/drawing/2014/main" id="{9E1BF881-4E2A-C9CF-53BD-F7B2422134A2}"/>
-              </a:ext>
-            </a:extLst>
-          </p:cNvPr>
+          <p:cNvPr id="4" name="Footer Placeholder 3"/>
           <p:cNvSpPr>
             <a:spLocks noGrp="1"/>
           </p:cNvSpPr>
@@ -2007,13 +1755,7 @@
       </p:sp>
       <p:sp>
         <p:nvSpPr>
-          <p:cNvPr id="5" name="Foliennummernplatzhalter 4">
-            <a:extLst>
-              <a:ext uri="{FF2B5EF4-FFF2-40B4-BE49-F238E27FC236}">
-                <a16:creationId xmlns:a16="http://schemas.microsoft.com/office/drawing/2014/main" id="{81D2D514-3296-CD8E-2FF1-9BD8834341DB}"/>
-              </a:ext>
-            </a:extLst>
-          </p:cNvPr>
+          <p:cNvPr id="5" name="Slide Number Placeholder 4"/>
           <p:cNvSpPr>
             <a:spLocks noGrp="1"/>
           </p:cNvSpPr>
@@ -2037,7 +1779,7 @@
     </p:spTree>
     <p:extLst>
       <p:ext uri="{BB962C8B-B14F-4D97-AF65-F5344CB8AC3E}">
-        <p14:creationId xmlns:p14="http://schemas.microsoft.com/office/powerpoint/2010/main" val="1144635736"/>
+        <p14:creationId xmlns:p14="http://schemas.microsoft.com/office/powerpoint/2010/main" val="18442234"/>
       </p:ext>
     </p:extLst>
   </p:cSld>
@@ -2066,13 +1808,7 @@
       </p:grpSpPr>
       <p:sp>
         <p:nvSpPr>
-          <p:cNvPr id="2" name="Datumsplatzhalter 1">
-            <a:extLst>
-              <a:ext uri="{FF2B5EF4-FFF2-40B4-BE49-F238E27FC236}">
-                <a16:creationId xmlns:a16="http://schemas.microsoft.com/office/drawing/2014/main" id="{33606F2E-D347-24F3-C697-B59E22234706}"/>
-              </a:ext>
-            </a:extLst>
-          </p:cNvPr>
+          <p:cNvPr id="2" name="Date Placeholder 1"/>
           <p:cNvSpPr>
             <a:spLocks noGrp="1"/>
           </p:cNvSpPr>
@@ -2087,7 +1823,7 @@
           <a:p>
             <a:fld id="{51E51E49-77BA-4FD5-BB46-972D51D76856}" type="datetimeFigureOut">
               <a:rPr lang="en-US" smtClean="0"/>
-              <a:t>8/5/2025</a:t>
+              <a:t>8/6/2025</a:t>
             </a:fld>
             <a:endParaRPr lang="en-US"/>
           </a:p>
@@ -2095,13 +1831,7 @@
       </p:sp>
       <p:sp>
         <p:nvSpPr>
-          <p:cNvPr id="3" name="Fußzeilenplatzhalter 2">
-            <a:extLst>
-              <a:ext uri="{FF2B5EF4-FFF2-40B4-BE49-F238E27FC236}">
-                <a16:creationId xmlns:a16="http://schemas.microsoft.com/office/drawing/2014/main" id="{41A2220D-CD92-D1F6-A5B3-0AE250BD6F1C}"/>
-              </a:ext>
-            </a:extLst>
-          </p:cNvPr>
+          <p:cNvPr id="3" name="Footer Placeholder 2"/>
           <p:cNvSpPr>
             <a:spLocks noGrp="1"/>
           </p:cNvSpPr>
@@ -2120,13 +1850,7 @@
       </p:sp>
       <p:sp>
         <p:nvSpPr>
-          <p:cNvPr id="4" name="Foliennummernplatzhalter 3">
-            <a:extLst>
-              <a:ext uri="{FF2B5EF4-FFF2-40B4-BE49-F238E27FC236}">
-                <a16:creationId xmlns:a16="http://schemas.microsoft.com/office/drawing/2014/main" id="{BB0EA07C-286A-8FE8-4D43-6155C3EA33CC}"/>
-              </a:ext>
-            </a:extLst>
-          </p:cNvPr>
+          <p:cNvPr id="4" name="Slide Number Placeholder 3"/>
           <p:cNvSpPr>
             <a:spLocks noGrp="1"/>
           </p:cNvSpPr>
@@ -2150,7 +1874,7 @@
     </p:spTree>
     <p:extLst>
       <p:ext uri="{BB962C8B-B14F-4D97-AF65-F5344CB8AC3E}">
-        <p14:creationId xmlns:p14="http://schemas.microsoft.com/office/powerpoint/2010/main" val="3731126093"/>
+        <p14:creationId xmlns:p14="http://schemas.microsoft.com/office/powerpoint/2010/main" val="1081485455"/>
       </p:ext>
     </p:extLst>
   </p:cSld>
@@ -2179,13 +1903,7 @@
       </p:grpSpPr>
       <p:sp>
         <p:nvSpPr>
-          <p:cNvPr id="2" name="Titel 1">
-            <a:extLst>
-              <a:ext uri="{FF2B5EF4-FFF2-40B4-BE49-F238E27FC236}">
-                <a16:creationId xmlns:a16="http://schemas.microsoft.com/office/drawing/2014/main" id="{AD29682F-3B8E-3E41-A6F5-B2BE68701482}"/>
-              </a:ext>
-            </a:extLst>
-          </p:cNvPr>
+          <p:cNvPr id="2" name="Title 1"/>
           <p:cNvSpPr>
             <a:spLocks noGrp="1"/>
           </p:cNvSpPr>
@@ -2195,15 +1913,15 @@
         </p:nvSpPr>
         <p:spPr>
           <a:xfrm>
-            <a:off x="839788" y="457200"/>
-            <a:ext cx="3932237" cy="1600200"/>
+            <a:off x="472381" y="660400"/>
+            <a:ext cx="2211884" cy="2311400"/>
           </a:xfrm>
         </p:spPr>
         <p:txBody>
           <a:bodyPr anchor="b"/>
           <a:lstStyle>
             <a:lvl1pPr>
-              <a:defRPr sz="3200"/>
+              <a:defRPr sz="2400"/>
             </a:lvl1pPr>
           </a:lstStyle>
           <a:p>
@@ -2211,19 +1929,13 @@
               <a:rPr lang="de-DE"/>
               <a:t>Mastertitelformat bearbeiten</a:t>
             </a:r>
-            <a:endParaRPr lang="en-US"/>
-          </a:p>
-        </p:txBody>
-      </p:sp>
-      <p:sp>
-        <p:nvSpPr>
-          <p:cNvPr id="3" name="Inhaltsplatzhalter 2">
-            <a:extLst>
-              <a:ext uri="{FF2B5EF4-FFF2-40B4-BE49-F238E27FC236}">
-                <a16:creationId xmlns:a16="http://schemas.microsoft.com/office/drawing/2014/main" id="{5DD0D491-889D-CE54-6490-303306E3F66A}"/>
-              </a:ext>
-            </a:extLst>
-          </p:cNvPr>
+            <a:endParaRPr lang="en-US" dirty="0"/>
+          </a:p>
+        </p:txBody>
+      </p:sp>
+      <p:sp>
+        <p:nvSpPr>
+          <p:cNvPr id="3" name="Content Placeholder 2"/>
           <p:cNvSpPr>
             <a:spLocks noGrp="1"/>
           </p:cNvSpPr>
@@ -2233,39 +1945,39 @@
         </p:nvSpPr>
         <p:spPr>
           <a:xfrm>
-            <a:off x="5183188" y="987425"/>
-            <a:ext cx="6172200" cy="4873625"/>
+            <a:off x="2915543" y="1426283"/>
+            <a:ext cx="3471863" cy="7039681"/>
           </a:xfrm>
         </p:spPr>
         <p:txBody>
           <a:bodyPr/>
           <a:lstStyle>
             <a:lvl1pPr>
-              <a:defRPr sz="3200"/>
+              <a:defRPr sz="2400"/>
             </a:lvl1pPr>
             <a:lvl2pPr>
-              <a:defRPr sz="2800"/>
+              <a:defRPr sz="2100"/>
             </a:lvl2pPr>
             <a:lvl3pPr>
-              <a:defRPr sz="2400"/>
+              <a:defRPr sz="1800"/>
             </a:lvl3pPr>
             <a:lvl4pPr>
-              <a:defRPr sz="2000"/>
+              <a:defRPr sz="1500"/>
             </a:lvl4pPr>
             <a:lvl5pPr>
-              <a:defRPr sz="2000"/>
+              <a:defRPr sz="1500"/>
             </a:lvl5pPr>
             <a:lvl6pPr>
-              <a:defRPr sz="2000"/>
+              <a:defRPr sz="1500"/>
             </a:lvl6pPr>
             <a:lvl7pPr>
-              <a:defRPr sz="2000"/>
+              <a:defRPr sz="1500"/>
             </a:lvl7pPr>
             <a:lvl8pPr>
-              <a:defRPr sz="2000"/>
+              <a:defRPr sz="1500"/>
             </a:lvl8pPr>
             <a:lvl9pPr>
-              <a:defRPr sz="2000"/>
+              <a:defRPr sz="1500"/>
             </a:lvl9pPr>
           </a:lstStyle>
           <a:p>
@@ -2302,19 +2014,13 @@
               <a:rPr lang="de-DE"/>
               <a:t>Fünfte Ebene</a:t>
             </a:r>
-            <a:endParaRPr lang="en-US"/>
-          </a:p>
-        </p:txBody>
-      </p:sp>
-      <p:sp>
-        <p:nvSpPr>
-          <p:cNvPr id="4" name="Textplatzhalter 3">
-            <a:extLst>
-              <a:ext uri="{FF2B5EF4-FFF2-40B4-BE49-F238E27FC236}">
-                <a16:creationId xmlns:a16="http://schemas.microsoft.com/office/drawing/2014/main" id="{E2E30C84-E48E-B419-FBB4-FAFCF045AD56}"/>
-              </a:ext>
-            </a:extLst>
-          </p:cNvPr>
+            <a:endParaRPr lang="en-US" dirty="0"/>
+          </a:p>
+        </p:txBody>
+      </p:sp>
+      <p:sp>
+        <p:nvSpPr>
+          <p:cNvPr id="4" name="Text Placeholder 3"/>
           <p:cNvSpPr>
             <a:spLocks noGrp="1"/>
           </p:cNvSpPr>
@@ -2324,8 +2030,8 @@
         </p:nvSpPr>
         <p:spPr>
           <a:xfrm>
-            <a:off x="839788" y="2057400"/>
-            <a:ext cx="3932237" cy="3811588"/>
+            <a:off x="472381" y="2971800"/>
+            <a:ext cx="2211884" cy="5505627"/>
           </a:xfrm>
         </p:spPr>
         <p:txBody>
@@ -2333,39 +2039,39 @@
           <a:lstStyle>
             <a:lvl1pPr marL="0" indent="0">
               <a:buNone/>
-              <a:defRPr sz="1600"/>
+              <a:defRPr sz="1200"/>
             </a:lvl1pPr>
-            <a:lvl2pPr marL="457200" indent="0">
-              <a:buNone/>
-              <a:defRPr sz="1400"/>
+            <a:lvl2pPr marL="342900" indent="0">
+              <a:buNone/>
+              <a:defRPr sz="1050"/>
             </a:lvl2pPr>
-            <a:lvl3pPr marL="914400" indent="0">
-              <a:buNone/>
-              <a:defRPr sz="1200"/>
+            <a:lvl3pPr marL="685800" indent="0">
+              <a:buNone/>
+              <a:defRPr sz="900"/>
             </a:lvl3pPr>
-            <a:lvl4pPr marL="1371600" indent="0">
-              <a:buNone/>
-              <a:defRPr sz="1000"/>
+            <a:lvl4pPr marL="1028700" indent="0">
+              <a:buNone/>
+              <a:defRPr sz="750"/>
             </a:lvl4pPr>
-            <a:lvl5pPr marL="1828800" indent="0">
-              <a:buNone/>
-              <a:defRPr sz="1000"/>
+            <a:lvl5pPr marL="1371600" indent="0">
+              <a:buNone/>
+              <a:defRPr sz="750"/>
             </a:lvl5pPr>
-            <a:lvl6pPr marL="2286000" indent="0">
-              <a:buNone/>
-              <a:defRPr sz="1000"/>
+            <a:lvl6pPr marL="1714500" indent="0">
+              <a:buNone/>
+              <a:defRPr sz="750"/>
             </a:lvl6pPr>
-            <a:lvl7pPr marL="2743200" indent="0">
-              <a:buNone/>
-              <a:defRPr sz="1000"/>
+            <a:lvl7pPr marL="2057400" indent="0">
+              <a:buNone/>
+              <a:defRPr sz="750"/>
             </a:lvl7pPr>
-            <a:lvl8pPr marL="3200400" indent="0">
-              <a:buNone/>
-              <a:defRPr sz="1000"/>
+            <a:lvl8pPr marL="2400300" indent="0">
+              <a:buNone/>
+              <a:defRPr sz="750"/>
             </a:lvl8pPr>
-            <a:lvl9pPr marL="3657600" indent="0">
-              <a:buNone/>
-              <a:defRPr sz="1000"/>
+            <a:lvl9pPr marL="2743200" indent="0">
+              <a:buNone/>
+              <a:defRPr sz="750"/>
             </a:lvl9pPr>
           </a:lstStyle>
           <a:p>
@@ -2379,13 +2085,7 @@
       </p:sp>
       <p:sp>
         <p:nvSpPr>
-          <p:cNvPr id="5" name="Datumsplatzhalter 4">
-            <a:extLst>
-              <a:ext uri="{FF2B5EF4-FFF2-40B4-BE49-F238E27FC236}">
-                <a16:creationId xmlns:a16="http://schemas.microsoft.com/office/drawing/2014/main" id="{A5F13865-4849-9D8A-94C2-09FAC46F198B}"/>
-              </a:ext>
-            </a:extLst>
-          </p:cNvPr>
+          <p:cNvPr id="5" name="Date Placeholder 4"/>
           <p:cNvSpPr>
             <a:spLocks noGrp="1"/>
           </p:cNvSpPr>
@@ -2400,7 +2100,7 @@
           <a:p>
             <a:fld id="{51E51E49-77BA-4FD5-BB46-972D51D76856}" type="datetimeFigureOut">
               <a:rPr lang="en-US" smtClean="0"/>
-              <a:t>8/5/2025</a:t>
+              <a:t>8/6/2025</a:t>
             </a:fld>
             <a:endParaRPr lang="en-US"/>
           </a:p>
@@ -2408,13 +2108,7 @@
       </p:sp>
       <p:sp>
         <p:nvSpPr>
-          <p:cNvPr id="6" name="Fußzeilenplatzhalter 5">
-            <a:extLst>
-              <a:ext uri="{FF2B5EF4-FFF2-40B4-BE49-F238E27FC236}">
-                <a16:creationId xmlns:a16="http://schemas.microsoft.com/office/drawing/2014/main" id="{731EAFF7-91B2-25B7-6EC2-4C58E33BE86E}"/>
-              </a:ext>
-            </a:extLst>
-          </p:cNvPr>
+          <p:cNvPr id="6" name="Footer Placeholder 5"/>
           <p:cNvSpPr>
             <a:spLocks noGrp="1"/>
           </p:cNvSpPr>
@@ -2433,13 +2127,7 @@
       </p:sp>
       <p:sp>
         <p:nvSpPr>
-          <p:cNvPr id="7" name="Foliennummernplatzhalter 6">
-            <a:extLst>
-              <a:ext uri="{FF2B5EF4-FFF2-40B4-BE49-F238E27FC236}">
-                <a16:creationId xmlns:a16="http://schemas.microsoft.com/office/drawing/2014/main" id="{F3851DEE-E0EA-DA42-F7AD-C1653E7DD327}"/>
-              </a:ext>
-            </a:extLst>
-          </p:cNvPr>
+          <p:cNvPr id="7" name="Slide Number Placeholder 6"/>
           <p:cNvSpPr>
             <a:spLocks noGrp="1"/>
           </p:cNvSpPr>
@@ -2463,7 +2151,7 @@
     </p:spTree>
     <p:extLst>
       <p:ext uri="{BB962C8B-B14F-4D97-AF65-F5344CB8AC3E}">
-        <p14:creationId xmlns:p14="http://schemas.microsoft.com/office/powerpoint/2010/main" val="2466256601"/>
+        <p14:creationId xmlns:p14="http://schemas.microsoft.com/office/powerpoint/2010/main" val="871494226"/>
       </p:ext>
     </p:extLst>
   </p:cSld>
@@ -2492,13 +2180,7 @@
       </p:grpSpPr>
       <p:sp>
         <p:nvSpPr>
-          <p:cNvPr id="2" name="Titel 1">
-            <a:extLst>
-              <a:ext uri="{FF2B5EF4-FFF2-40B4-BE49-F238E27FC236}">
-                <a16:creationId xmlns:a16="http://schemas.microsoft.com/office/drawing/2014/main" id="{EAF5DAF1-86C1-5719-4922-5B52C009517B}"/>
-              </a:ext>
-            </a:extLst>
-          </p:cNvPr>
+          <p:cNvPr id="2" name="Title 1"/>
           <p:cNvSpPr>
             <a:spLocks noGrp="1"/>
           </p:cNvSpPr>
@@ -2508,15 +2190,15 @@
         </p:nvSpPr>
         <p:spPr>
           <a:xfrm>
-            <a:off x="839788" y="457200"/>
-            <a:ext cx="3932237" cy="1600200"/>
+            <a:off x="472381" y="660400"/>
+            <a:ext cx="2211884" cy="2311400"/>
           </a:xfrm>
         </p:spPr>
         <p:txBody>
           <a:bodyPr anchor="b"/>
           <a:lstStyle>
             <a:lvl1pPr>
-              <a:defRPr sz="3200"/>
+              <a:defRPr sz="2400"/>
             </a:lvl1pPr>
           </a:lstStyle>
           <a:p>
@@ -2524,21 +2206,15 @@
               <a:rPr lang="de-DE"/>
               <a:t>Mastertitelformat bearbeiten</a:t>
             </a:r>
-            <a:endParaRPr lang="en-US"/>
-          </a:p>
-        </p:txBody>
-      </p:sp>
-      <p:sp>
-        <p:nvSpPr>
-          <p:cNvPr id="3" name="Bildplatzhalter 2">
-            <a:extLst>
-              <a:ext uri="{FF2B5EF4-FFF2-40B4-BE49-F238E27FC236}">
-                <a16:creationId xmlns:a16="http://schemas.microsoft.com/office/drawing/2014/main" id="{770CC679-6259-84E8-2CB9-20C53EACE35B}"/>
-              </a:ext>
-            </a:extLst>
-          </p:cNvPr>
-          <p:cNvSpPr>
-            <a:spLocks noGrp="1"/>
+            <a:endParaRPr lang="en-US" dirty="0"/>
+          </a:p>
+        </p:txBody>
+      </p:sp>
+      <p:sp>
+        <p:nvSpPr>
+          <p:cNvPr id="3" name="Picture Placeholder 2"/>
+          <p:cNvSpPr>
+            <a:spLocks noGrp="1" noChangeAspect="1"/>
           </p:cNvSpPr>
           <p:nvPr>
             <p:ph type="pic" idx="1"/>
@@ -2546,64 +2222,62 @@
         </p:nvSpPr>
         <p:spPr>
           <a:xfrm>
-            <a:off x="5183188" y="987425"/>
-            <a:ext cx="6172200" cy="4873625"/>
-          </a:xfrm>
-        </p:spPr>
-        <p:txBody>
-          <a:bodyPr/>
+            <a:off x="2915543" y="1426283"/>
+            <a:ext cx="3471863" cy="7039681"/>
+          </a:xfrm>
+        </p:spPr>
+        <p:txBody>
+          <a:bodyPr anchor="t"/>
           <a:lstStyle>
             <a:lvl1pPr marL="0" indent="0">
               <a:buNone/>
-              <a:defRPr sz="3200"/>
+              <a:defRPr sz="2400"/>
             </a:lvl1pPr>
-            <a:lvl2pPr marL="457200" indent="0">
-              <a:buNone/>
-              <a:defRPr sz="2800"/>
+            <a:lvl2pPr marL="342900" indent="0">
+              <a:buNone/>
+              <a:defRPr sz="2100"/>
             </a:lvl2pPr>
-            <a:lvl3pPr marL="914400" indent="0">
-              <a:buNone/>
-              <a:defRPr sz="2400"/>
+            <a:lvl3pPr marL="685800" indent="0">
+              <a:buNone/>
+              <a:defRPr sz="1800"/>
             </a:lvl3pPr>
-            <a:lvl4pPr marL="1371600" indent="0">
-              <a:buNone/>
-              <a:defRPr sz="2000"/>
+            <a:lvl4pPr marL="1028700" indent="0">
+              <a:buNone/>
+              <a:defRPr sz="1500"/>
             </a:lvl4pPr>
-            <a:lvl5pPr marL="1828800" indent="0">
-              <a:buNone/>
-              <a:defRPr sz="2000"/>
+            <a:lvl5pPr marL="1371600" indent="0">
+              <a:buNone/>
+              <a:defRPr sz="1500"/>
             </a:lvl5pPr>
-            <a:lvl6pPr marL="2286000" indent="0">
-              <a:buNone/>
-              <a:defRPr sz="2000"/>
+            <a:lvl6pPr marL="1714500" indent="0">
+              <a:buNone/>
+              <a:defRPr sz="1500"/>
             </a:lvl6pPr>
-            <a:lvl7pPr marL="2743200" indent="0">
-              <a:buNone/>
-              <a:defRPr sz="2000"/>
+            <a:lvl7pPr marL="2057400" indent="0">
+              <a:buNone/>
+              <a:defRPr sz="1500"/>
             </a:lvl7pPr>
-            <a:lvl8pPr marL="3200400" indent="0">
-              <a:buNone/>
-              <a:defRPr sz="2000"/>
+            <a:lvl8pPr marL="2400300" indent="0">
+              <a:buNone/>
+              <a:defRPr sz="1500"/>
             </a:lvl8pPr>
-            <a:lvl9pPr marL="3657600" indent="0">
-              <a:buNone/>
-              <a:defRPr sz="2000"/>
+            <a:lvl9pPr marL="2743200" indent="0">
+              <a:buNone/>
+              <a:defRPr sz="1500"/>
             </a:lvl9pPr>
           </a:lstStyle>
           <a:p>
-            <a:endParaRPr lang="en-US"/>
-          </a:p>
-        </p:txBody>
-      </p:sp>
-      <p:sp>
-        <p:nvSpPr>
-          <p:cNvPr id="4" name="Textplatzhalter 3">
-            <a:extLst>
-              <a:ext uri="{FF2B5EF4-FFF2-40B4-BE49-F238E27FC236}">
-                <a16:creationId xmlns:a16="http://schemas.microsoft.com/office/drawing/2014/main" id="{84036BCE-4681-3220-35C0-E7B8610EEE52}"/>
-              </a:ext>
-            </a:extLst>
-          </p:cNvPr>
+            <a:r>
+              <a:rPr lang="de-DE"/>
+              <a:t>Bild durch Klicken auf Symbol hinzufügen</a:t>
+            </a:r>
+            <a:endParaRPr lang="en-US" dirty="0"/>
+          </a:p>
+        </p:txBody>
+      </p:sp>
+      <p:sp>
+        <p:nvSpPr>
+          <p:cNvPr id="4" name="Text Placeholder 3"/>
           <p:cNvSpPr>
             <a:spLocks noGrp="1"/>
           </p:cNvSpPr>
@@ -2613,8 +2287,8 @@
         </p:nvSpPr>
         <p:spPr>
           <a:xfrm>
-            <a:off x="839788" y="2057400"/>
-            <a:ext cx="3932237" cy="3811588"/>
+            <a:off x="472381" y="2971800"/>
+            <a:ext cx="2211884" cy="5505627"/>
           </a:xfrm>
         </p:spPr>
         <p:txBody>
@@ -2622,39 +2296,39 @@
           <a:lstStyle>
             <a:lvl1pPr marL="0" indent="0">
               <a:buNone/>
-              <a:defRPr sz="1600"/>
+              <a:defRPr sz="1200"/>
             </a:lvl1pPr>
-            <a:lvl2pPr marL="457200" indent="0">
-              <a:buNone/>
-              <a:defRPr sz="1400"/>
+            <a:lvl2pPr marL="342900" indent="0">
+              <a:buNone/>
+              <a:defRPr sz="1050"/>
             </a:lvl2pPr>
-            <a:lvl3pPr marL="914400" indent="0">
-              <a:buNone/>
-              <a:defRPr sz="1200"/>
+            <a:lvl3pPr marL="685800" indent="0">
+              <a:buNone/>
+              <a:defRPr sz="900"/>
             </a:lvl3pPr>
-            <a:lvl4pPr marL="1371600" indent="0">
-              <a:buNone/>
-              <a:defRPr sz="1000"/>
+            <a:lvl4pPr marL="1028700" indent="0">
+              <a:buNone/>
+              <a:defRPr sz="750"/>
             </a:lvl4pPr>
-            <a:lvl5pPr marL="1828800" indent="0">
-              <a:buNone/>
-              <a:defRPr sz="1000"/>
+            <a:lvl5pPr marL="1371600" indent="0">
+              <a:buNone/>
+              <a:defRPr sz="750"/>
             </a:lvl5pPr>
-            <a:lvl6pPr marL="2286000" indent="0">
-              <a:buNone/>
-              <a:defRPr sz="1000"/>
+            <a:lvl6pPr marL="1714500" indent="0">
+              <a:buNone/>
+              <a:defRPr sz="750"/>
             </a:lvl6pPr>
-            <a:lvl7pPr marL="2743200" indent="0">
-              <a:buNone/>
-              <a:defRPr sz="1000"/>
+            <a:lvl7pPr marL="2057400" indent="0">
+              <a:buNone/>
+              <a:defRPr sz="750"/>
             </a:lvl7pPr>
-            <a:lvl8pPr marL="3200400" indent="0">
-              <a:buNone/>
-              <a:defRPr sz="1000"/>
+            <a:lvl8pPr marL="2400300" indent="0">
+              <a:buNone/>
+              <a:defRPr sz="750"/>
             </a:lvl8pPr>
-            <a:lvl9pPr marL="3657600" indent="0">
-              <a:buNone/>
-              <a:defRPr sz="1000"/>
+            <a:lvl9pPr marL="2743200" indent="0">
+              <a:buNone/>
+              <a:defRPr sz="750"/>
             </a:lvl9pPr>
           </a:lstStyle>
           <a:p>
@@ -2668,13 +2342,7 @@
       </p:sp>
       <p:sp>
         <p:nvSpPr>
-          <p:cNvPr id="5" name="Datumsplatzhalter 4">
-            <a:extLst>
-              <a:ext uri="{FF2B5EF4-FFF2-40B4-BE49-F238E27FC236}">
-                <a16:creationId xmlns:a16="http://schemas.microsoft.com/office/drawing/2014/main" id="{D60E5537-75EF-228F-E233-DE7E4B7D8EE0}"/>
-              </a:ext>
-            </a:extLst>
-          </p:cNvPr>
+          <p:cNvPr id="5" name="Date Placeholder 4"/>
           <p:cNvSpPr>
             <a:spLocks noGrp="1"/>
           </p:cNvSpPr>
@@ -2689,7 +2357,7 @@
           <a:p>
             <a:fld id="{51E51E49-77BA-4FD5-BB46-972D51D76856}" type="datetimeFigureOut">
               <a:rPr lang="en-US" smtClean="0"/>
-              <a:t>8/5/2025</a:t>
+              <a:t>8/6/2025</a:t>
             </a:fld>
             <a:endParaRPr lang="en-US"/>
           </a:p>
@@ -2697,13 +2365,7 @@
       </p:sp>
       <p:sp>
         <p:nvSpPr>
-          <p:cNvPr id="6" name="Fußzeilenplatzhalter 5">
-            <a:extLst>
-              <a:ext uri="{FF2B5EF4-FFF2-40B4-BE49-F238E27FC236}">
-                <a16:creationId xmlns:a16="http://schemas.microsoft.com/office/drawing/2014/main" id="{24CCA8AA-569B-5D6F-623F-6A5D49509CF6}"/>
-              </a:ext>
-            </a:extLst>
-          </p:cNvPr>
+          <p:cNvPr id="6" name="Footer Placeholder 5"/>
           <p:cNvSpPr>
             <a:spLocks noGrp="1"/>
           </p:cNvSpPr>
@@ -2722,13 +2384,7 @@
       </p:sp>
       <p:sp>
         <p:nvSpPr>
-          <p:cNvPr id="7" name="Foliennummernplatzhalter 6">
-            <a:extLst>
-              <a:ext uri="{FF2B5EF4-FFF2-40B4-BE49-F238E27FC236}">
-                <a16:creationId xmlns:a16="http://schemas.microsoft.com/office/drawing/2014/main" id="{E7037293-E60F-2287-58DF-B33864A26575}"/>
-              </a:ext>
-            </a:extLst>
-          </p:cNvPr>
+          <p:cNvPr id="7" name="Slide Number Placeholder 6"/>
           <p:cNvSpPr>
             <a:spLocks noGrp="1"/>
           </p:cNvSpPr>
@@ -2752,7 +2408,7 @@
     </p:spTree>
     <p:extLst>
       <p:ext uri="{BB962C8B-B14F-4D97-AF65-F5344CB8AC3E}">
-        <p14:creationId xmlns:p14="http://schemas.microsoft.com/office/powerpoint/2010/main" val="3542070997"/>
+        <p14:creationId xmlns:p14="http://schemas.microsoft.com/office/powerpoint/2010/main" val="2765406701"/>
       </p:ext>
     </p:extLst>
   </p:cSld>
@@ -2786,13 +2442,7 @@
       </p:grpSpPr>
       <p:sp>
         <p:nvSpPr>
-          <p:cNvPr id="2" name="Titelplatzhalter 1">
-            <a:extLst>
-              <a:ext uri="{FF2B5EF4-FFF2-40B4-BE49-F238E27FC236}">
-                <a16:creationId xmlns:a16="http://schemas.microsoft.com/office/drawing/2014/main" id="{CBDFD4EC-2A36-38C1-0DF0-BC24710613EB}"/>
-              </a:ext>
-            </a:extLst>
-          </p:cNvPr>
+          <p:cNvPr id="2" name="Title Placeholder 1"/>
           <p:cNvSpPr>
             <a:spLocks noGrp="1"/>
           </p:cNvSpPr>
@@ -2802,8 +2452,8 @@
         </p:nvSpPr>
         <p:spPr>
           <a:xfrm>
-            <a:off x="838200" y="365125"/>
-            <a:ext cx="10515600" cy="1325563"/>
+            <a:off x="471488" y="527405"/>
+            <a:ext cx="5915025" cy="1914702"/>
           </a:xfrm>
           <a:prstGeom prst="rect">
             <a:avLst/>
@@ -2819,19 +2469,13 @@
               <a:rPr lang="de-DE"/>
               <a:t>Mastertitelformat bearbeiten</a:t>
             </a:r>
-            <a:endParaRPr lang="en-US"/>
-          </a:p>
-        </p:txBody>
-      </p:sp>
-      <p:sp>
-        <p:nvSpPr>
-          <p:cNvPr id="3" name="Textplatzhalter 2">
-            <a:extLst>
-              <a:ext uri="{FF2B5EF4-FFF2-40B4-BE49-F238E27FC236}">
-                <a16:creationId xmlns:a16="http://schemas.microsoft.com/office/drawing/2014/main" id="{892ACA56-D03C-02CF-E9F1-4A1E80A643F6}"/>
-              </a:ext>
-            </a:extLst>
-          </p:cNvPr>
+            <a:endParaRPr lang="en-US" dirty="0"/>
+          </a:p>
+        </p:txBody>
+      </p:sp>
+      <p:sp>
+        <p:nvSpPr>
+          <p:cNvPr id="3" name="Text Placeholder 2"/>
           <p:cNvSpPr>
             <a:spLocks noGrp="1"/>
           </p:cNvSpPr>
@@ -2841,8 +2485,8 @@
         </p:nvSpPr>
         <p:spPr>
           <a:xfrm>
-            <a:off x="838200" y="1825625"/>
-            <a:ext cx="10515600" cy="4351338"/>
+            <a:off x="471488" y="2637014"/>
+            <a:ext cx="5915025" cy="6285266"/>
           </a:xfrm>
           <a:prstGeom prst="rect">
             <a:avLst/>
@@ -2887,19 +2531,13 @@
               <a:rPr lang="de-DE"/>
               <a:t>Fünfte Ebene</a:t>
             </a:r>
-            <a:endParaRPr lang="en-US"/>
-          </a:p>
-        </p:txBody>
-      </p:sp>
-      <p:sp>
-        <p:nvSpPr>
-          <p:cNvPr id="4" name="Datumsplatzhalter 3">
-            <a:extLst>
-              <a:ext uri="{FF2B5EF4-FFF2-40B4-BE49-F238E27FC236}">
-                <a16:creationId xmlns:a16="http://schemas.microsoft.com/office/drawing/2014/main" id="{2C4001BD-292B-B548-1F61-1C02F06F1E8D}"/>
-              </a:ext>
-            </a:extLst>
-          </p:cNvPr>
+            <a:endParaRPr lang="en-US" dirty="0"/>
+          </a:p>
+        </p:txBody>
+      </p:sp>
+      <p:sp>
+        <p:nvSpPr>
+          <p:cNvPr id="4" name="Date Placeholder 3"/>
           <p:cNvSpPr>
             <a:spLocks noGrp="1"/>
           </p:cNvSpPr>
@@ -2909,8 +2547,8 @@
         </p:nvSpPr>
         <p:spPr>
           <a:xfrm>
-            <a:off x="838200" y="6356350"/>
-            <a:ext cx="2743200" cy="365125"/>
+            <a:off x="471488" y="9181397"/>
+            <a:ext cx="1543050" cy="527403"/>
           </a:xfrm>
           <a:prstGeom prst="rect">
             <a:avLst/>
@@ -2920,7 +2558,7 @@
           <a:bodyPr vert="horz" lIns="91440" tIns="45720" rIns="91440" bIns="45720" rtlCol="0" anchor="ctr"/>
           <a:lstStyle>
             <a:lvl1pPr algn="l">
-              <a:defRPr sz="1200">
+              <a:defRPr sz="900">
                 <a:solidFill>
                   <a:schemeClr val="tx1">
                     <a:tint val="82000"/>
@@ -2932,7 +2570,7 @@
           <a:p>
             <a:fld id="{51E51E49-77BA-4FD5-BB46-972D51D76856}" type="datetimeFigureOut">
               <a:rPr lang="en-US" smtClean="0"/>
-              <a:t>8/5/2025</a:t>
+              <a:t>8/6/2025</a:t>
             </a:fld>
             <a:endParaRPr lang="en-US"/>
           </a:p>
@@ -2940,13 +2578,7 @@
       </p:sp>
       <p:sp>
         <p:nvSpPr>
-          <p:cNvPr id="5" name="Fußzeilenplatzhalter 4">
-            <a:extLst>
-              <a:ext uri="{FF2B5EF4-FFF2-40B4-BE49-F238E27FC236}">
-                <a16:creationId xmlns:a16="http://schemas.microsoft.com/office/drawing/2014/main" id="{6E8FBE7E-0D61-7B54-D3C4-D117EC529485}"/>
-              </a:ext>
-            </a:extLst>
-          </p:cNvPr>
+          <p:cNvPr id="5" name="Footer Placeholder 4"/>
           <p:cNvSpPr>
             <a:spLocks noGrp="1"/>
           </p:cNvSpPr>
@@ -2956,8 +2588,8 @@
         </p:nvSpPr>
         <p:spPr>
           <a:xfrm>
-            <a:off x="4038600" y="6356350"/>
-            <a:ext cx="4114800" cy="365125"/>
+            <a:off x="2271713" y="9181397"/>
+            <a:ext cx="2314575" cy="527403"/>
           </a:xfrm>
           <a:prstGeom prst="rect">
             <a:avLst/>
@@ -2967,7 +2599,7 @@
           <a:bodyPr vert="horz" lIns="91440" tIns="45720" rIns="91440" bIns="45720" rtlCol="0" anchor="ctr"/>
           <a:lstStyle>
             <a:lvl1pPr algn="ctr">
-              <a:defRPr sz="1200">
+              <a:defRPr sz="900">
                 <a:solidFill>
                   <a:schemeClr val="tx1">
                     <a:tint val="82000"/>
@@ -2983,13 +2615,7 @@
       </p:sp>
       <p:sp>
         <p:nvSpPr>
-          <p:cNvPr id="6" name="Foliennummernplatzhalter 5">
-            <a:extLst>
-              <a:ext uri="{FF2B5EF4-FFF2-40B4-BE49-F238E27FC236}">
-                <a16:creationId xmlns:a16="http://schemas.microsoft.com/office/drawing/2014/main" id="{34131162-7131-481A-7EAD-805D865D03FF}"/>
-              </a:ext>
-            </a:extLst>
-          </p:cNvPr>
+          <p:cNvPr id="6" name="Slide Number Placeholder 5"/>
           <p:cNvSpPr>
             <a:spLocks noGrp="1"/>
           </p:cNvSpPr>
@@ -2999,8 +2625,8 @@
         </p:nvSpPr>
         <p:spPr>
           <a:xfrm>
-            <a:off x="8610600" y="6356350"/>
-            <a:ext cx="2743200" cy="365125"/>
+            <a:off x="4843463" y="9181397"/>
+            <a:ext cx="1543050" cy="527403"/>
           </a:xfrm>
           <a:prstGeom prst="rect">
             <a:avLst/>
@@ -3010,7 +2636,7 @@
           <a:bodyPr vert="horz" lIns="91440" tIns="45720" rIns="91440" bIns="45720" rtlCol="0" anchor="ctr"/>
           <a:lstStyle>
             <a:lvl1pPr algn="r">
-              <a:defRPr sz="1200">
+              <a:defRPr sz="900">
                 <a:solidFill>
                   <a:schemeClr val="tx1">
                     <a:tint val="82000"/>
@@ -3031,27 +2657,27 @@
     </p:spTree>
     <p:extLst>
       <p:ext uri="{BB962C8B-B14F-4D97-AF65-F5344CB8AC3E}">
-        <p14:creationId xmlns:p14="http://schemas.microsoft.com/office/powerpoint/2010/main" val="2258688744"/>
+        <p14:creationId xmlns:p14="http://schemas.microsoft.com/office/powerpoint/2010/main" val="3030458684"/>
       </p:ext>
     </p:extLst>
   </p:cSld>
   <p:clrMap bg1="lt1" tx1="dk1" bg2="lt2" tx2="dk2" accent1="accent1" accent2="accent2" accent3="accent3" accent4="accent4" accent5="accent5" accent6="accent6" hlink="hlink" folHlink="folHlink"/>
   <p:sldLayoutIdLst>
-    <p:sldLayoutId id="2147483649" r:id="rId1"/>
-    <p:sldLayoutId id="2147483650" r:id="rId2"/>
-    <p:sldLayoutId id="2147483651" r:id="rId3"/>
-    <p:sldLayoutId id="2147483652" r:id="rId4"/>
-    <p:sldLayoutId id="2147483653" r:id="rId5"/>
-    <p:sldLayoutId id="2147483654" r:id="rId6"/>
-    <p:sldLayoutId id="2147483655" r:id="rId7"/>
-    <p:sldLayoutId id="2147483656" r:id="rId8"/>
-    <p:sldLayoutId id="2147483657" r:id="rId9"/>
-    <p:sldLayoutId id="2147483658" r:id="rId10"/>
-    <p:sldLayoutId id="2147483659" r:id="rId11"/>
+    <p:sldLayoutId id="2147483661" r:id="rId1"/>
+    <p:sldLayoutId id="2147483662" r:id="rId2"/>
+    <p:sldLayoutId id="2147483663" r:id="rId3"/>
+    <p:sldLayoutId id="2147483664" r:id="rId4"/>
+    <p:sldLayoutId id="2147483665" r:id="rId5"/>
+    <p:sldLayoutId id="2147483666" r:id="rId6"/>
+    <p:sldLayoutId id="2147483667" r:id="rId7"/>
+    <p:sldLayoutId id="2147483668" r:id="rId8"/>
+    <p:sldLayoutId id="2147483669" r:id="rId9"/>
+    <p:sldLayoutId id="2147483670" r:id="rId10"/>
+    <p:sldLayoutId id="2147483671" r:id="rId11"/>
   </p:sldLayoutIdLst>
   <p:txStyles>
     <p:titleStyle>
-      <a:lvl1pPr algn="l" defTabSz="914400" rtl="0" eaLnBrk="1" latinLnBrk="0" hangingPunct="1">
+      <a:lvl1pPr algn="l" defTabSz="685800" rtl="0" eaLnBrk="1" latinLnBrk="0" hangingPunct="1">
         <a:lnSpc>
           <a:spcPct val="90000"/>
         </a:lnSpc>
@@ -3059,7 +2685,7 @@
           <a:spcPct val="0"/>
         </a:spcBef>
         <a:buNone/>
-        <a:defRPr sz="4400" kern="1200">
+        <a:defRPr sz="3300" kern="1200">
           <a:solidFill>
             <a:schemeClr val="tx1"/>
           </a:solidFill>
@@ -3070,16 +2696,16 @@
       </a:lvl1pPr>
     </p:titleStyle>
     <p:bodyStyle>
-      <a:lvl1pPr marL="228600" indent="-228600" algn="l" defTabSz="914400" rtl="0" eaLnBrk="1" latinLnBrk="0" hangingPunct="1">
+      <a:lvl1pPr marL="171450" indent="-171450" algn="l" defTabSz="685800" rtl="0" eaLnBrk="1" latinLnBrk="0" hangingPunct="1">
         <a:lnSpc>
           <a:spcPct val="90000"/>
         </a:lnSpc>
         <a:spcBef>
-          <a:spcPts val="1000"/>
+          <a:spcPts val="750"/>
         </a:spcBef>
         <a:buFont typeface="Arial" panose="020B0604020202020204" pitchFamily="34" charset="0"/>
         <a:buChar char="•"/>
-        <a:defRPr sz="2800" kern="1200">
+        <a:defRPr sz="2100" kern="1200">
           <a:solidFill>
             <a:schemeClr val="tx1"/>
           </a:solidFill>
@@ -3088,48 +2714,12 @@
           <a:cs typeface="+mn-cs"/>
         </a:defRPr>
       </a:lvl1pPr>
-      <a:lvl2pPr marL="685800" indent="-228600" algn="l" defTabSz="914400" rtl="0" eaLnBrk="1" latinLnBrk="0" hangingPunct="1">
+      <a:lvl2pPr marL="514350" indent="-171450" algn="l" defTabSz="685800" rtl="0" eaLnBrk="1" latinLnBrk="0" hangingPunct="1">
         <a:lnSpc>
           <a:spcPct val="90000"/>
         </a:lnSpc>
         <a:spcBef>
-          <a:spcPts val="500"/>
-        </a:spcBef>
-        <a:buFont typeface="Arial" panose="020B0604020202020204" pitchFamily="34" charset="0"/>
-        <a:buChar char="•"/>
-        <a:defRPr sz="2400" kern="1200">
-          <a:solidFill>
-            <a:schemeClr val="tx1"/>
-          </a:solidFill>
-          <a:latin typeface="+mn-lt"/>
-          <a:ea typeface="+mn-ea"/>
-          <a:cs typeface="+mn-cs"/>
-        </a:defRPr>
-      </a:lvl2pPr>
-      <a:lvl3pPr marL="1143000" indent="-228600" algn="l" defTabSz="914400" rtl="0" eaLnBrk="1" latinLnBrk="0" hangingPunct="1">
-        <a:lnSpc>
-          <a:spcPct val="90000"/>
-        </a:lnSpc>
-        <a:spcBef>
-          <a:spcPts val="500"/>
-        </a:spcBef>
-        <a:buFont typeface="Arial" panose="020B0604020202020204" pitchFamily="34" charset="0"/>
-        <a:buChar char="•"/>
-        <a:defRPr sz="2000" kern="1200">
-          <a:solidFill>
-            <a:schemeClr val="tx1"/>
-          </a:solidFill>
-          <a:latin typeface="+mn-lt"/>
-          <a:ea typeface="+mn-ea"/>
-          <a:cs typeface="+mn-cs"/>
-        </a:defRPr>
-      </a:lvl3pPr>
-      <a:lvl4pPr marL="1600200" indent="-228600" algn="l" defTabSz="914400" rtl="0" eaLnBrk="1" latinLnBrk="0" hangingPunct="1">
-        <a:lnSpc>
-          <a:spcPct val="90000"/>
-        </a:lnSpc>
-        <a:spcBef>
-          <a:spcPts val="500"/>
+          <a:spcPts val="375"/>
         </a:spcBef>
         <a:buFont typeface="Arial" panose="020B0604020202020204" pitchFamily="34" charset="0"/>
         <a:buChar char="•"/>
@@ -3141,17 +2731,53 @@
           <a:ea typeface="+mn-ea"/>
           <a:cs typeface="+mn-cs"/>
         </a:defRPr>
-      </a:lvl4pPr>
-      <a:lvl5pPr marL="2057400" indent="-228600" algn="l" defTabSz="914400" rtl="0" eaLnBrk="1" latinLnBrk="0" hangingPunct="1">
+      </a:lvl2pPr>
+      <a:lvl3pPr marL="857250" indent="-171450" algn="l" defTabSz="685800" rtl="0" eaLnBrk="1" latinLnBrk="0" hangingPunct="1">
         <a:lnSpc>
           <a:spcPct val="90000"/>
         </a:lnSpc>
         <a:spcBef>
-          <a:spcPts val="500"/>
+          <a:spcPts val="375"/>
         </a:spcBef>
         <a:buFont typeface="Arial" panose="020B0604020202020204" pitchFamily="34" charset="0"/>
         <a:buChar char="•"/>
-        <a:defRPr sz="1800" kern="1200">
+        <a:defRPr sz="1500" kern="1200">
+          <a:solidFill>
+            <a:schemeClr val="tx1"/>
+          </a:solidFill>
+          <a:latin typeface="+mn-lt"/>
+          <a:ea typeface="+mn-ea"/>
+          <a:cs typeface="+mn-cs"/>
+        </a:defRPr>
+      </a:lvl3pPr>
+      <a:lvl4pPr marL="1200150" indent="-171450" algn="l" defTabSz="685800" rtl="0" eaLnBrk="1" latinLnBrk="0" hangingPunct="1">
+        <a:lnSpc>
+          <a:spcPct val="90000"/>
+        </a:lnSpc>
+        <a:spcBef>
+          <a:spcPts val="375"/>
+        </a:spcBef>
+        <a:buFont typeface="Arial" panose="020B0604020202020204" pitchFamily="34" charset="0"/>
+        <a:buChar char="•"/>
+        <a:defRPr sz="1350" kern="1200">
+          <a:solidFill>
+            <a:schemeClr val="tx1"/>
+          </a:solidFill>
+          <a:latin typeface="+mn-lt"/>
+          <a:ea typeface="+mn-ea"/>
+          <a:cs typeface="+mn-cs"/>
+        </a:defRPr>
+      </a:lvl4pPr>
+      <a:lvl5pPr marL="1543050" indent="-171450" algn="l" defTabSz="685800" rtl="0" eaLnBrk="1" latinLnBrk="0" hangingPunct="1">
+        <a:lnSpc>
+          <a:spcPct val="90000"/>
+        </a:lnSpc>
+        <a:spcBef>
+          <a:spcPts val="375"/>
+        </a:spcBef>
+        <a:buFont typeface="Arial" panose="020B0604020202020204" pitchFamily="34" charset="0"/>
+        <a:buChar char="•"/>
+        <a:defRPr sz="1350" kern="1200">
           <a:solidFill>
             <a:schemeClr val="tx1"/>
           </a:solidFill>
@@ -3160,16 +2786,16 @@
           <a:cs typeface="+mn-cs"/>
         </a:defRPr>
       </a:lvl5pPr>
-      <a:lvl6pPr marL="2514600" indent="-228600" algn="l" defTabSz="914400" rtl="0" eaLnBrk="1" latinLnBrk="0" hangingPunct="1">
+      <a:lvl6pPr marL="1885950" indent="-171450" algn="l" defTabSz="685800" rtl="0" eaLnBrk="1" latinLnBrk="0" hangingPunct="1">
         <a:lnSpc>
           <a:spcPct val="90000"/>
         </a:lnSpc>
         <a:spcBef>
-          <a:spcPts val="500"/>
+          <a:spcPts val="375"/>
         </a:spcBef>
         <a:buFont typeface="Arial" panose="020B0604020202020204" pitchFamily="34" charset="0"/>
         <a:buChar char="•"/>
-        <a:defRPr sz="1800" kern="1200">
+        <a:defRPr sz="1350" kern="1200">
           <a:solidFill>
             <a:schemeClr val="tx1"/>
           </a:solidFill>
@@ -3178,16 +2804,16 @@
           <a:cs typeface="+mn-cs"/>
         </a:defRPr>
       </a:lvl6pPr>
-      <a:lvl7pPr marL="2971800" indent="-228600" algn="l" defTabSz="914400" rtl="0" eaLnBrk="1" latinLnBrk="0" hangingPunct="1">
+      <a:lvl7pPr marL="2228850" indent="-171450" algn="l" defTabSz="685800" rtl="0" eaLnBrk="1" latinLnBrk="0" hangingPunct="1">
         <a:lnSpc>
           <a:spcPct val="90000"/>
         </a:lnSpc>
         <a:spcBef>
-          <a:spcPts val="500"/>
+          <a:spcPts val="375"/>
         </a:spcBef>
         <a:buFont typeface="Arial" panose="020B0604020202020204" pitchFamily="34" charset="0"/>
         <a:buChar char="•"/>
-        <a:defRPr sz="1800" kern="1200">
+        <a:defRPr sz="1350" kern="1200">
           <a:solidFill>
             <a:schemeClr val="tx1"/>
           </a:solidFill>
@@ -3196,16 +2822,16 @@
           <a:cs typeface="+mn-cs"/>
         </a:defRPr>
       </a:lvl7pPr>
-      <a:lvl8pPr marL="3429000" indent="-228600" algn="l" defTabSz="914400" rtl="0" eaLnBrk="1" latinLnBrk="0" hangingPunct="1">
+      <a:lvl8pPr marL="2571750" indent="-171450" algn="l" defTabSz="685800" rtl="0" eaLnBrk="1" latinLnBrk="0" hangingPunct="1">
         <a:lnSpc>
           <a:spcPct val="90000"/>
         </a:lnSpc>
         <a:spcBef>
-          <a:spcPts val="500"/>
+          <a:spcPts val="375"/>
         </a:spcBef>
         <a:buFont typeface="Arial" panose="020B0604020202020204" pitchFamily="34" charset="0"/>
         <a:buChar char="•"/>
-        <a:defRPr sz="1800" kern="1200">
+        <a:defRPr sz="1350" kern="1200">
           <a:solidFill>
             <a:schemeClr val="tx1"/>
           </a:solidFill>
@@ -3214,16 +2840,16 @@
           <a:cs typeface="+mn-cs"/>
         </a:defRPr>
       </a:lvl8pPr>
-      <a:lvl9pPr marL="3886200" indent="-228600" algn="l" defTabSz="914400" rtl="0" eaLnBrk="1" latinLnBrk="0" hangingPunct="1">
+      <a:lvl9pPr marL="2914650" indent="-171450" algn="l" defTabSz="685800" rtl="0" eaLnBrk="1" latinLnBrk="0" hangingPunct="1">
         <a:lnSpc>
           <a:spcPct val="90000"/>
         </a:lnSpc>
         <a:spcBef>
-          <a:spcPts val="500"/>
+          <a:spcPts val="375"/>
         </a:spcBef>
         <a:buFont typeface="Arial" panose="020B0604020202020204" pitchFamily="34" charset="0"/>
         <a:buChar char="•"/>
-        <a:defRPr sz="1800" kern="1200">
+        <a:defRPr sz="1350" kern="1200">
           <a:solidFill>
             <a:schemeClr val="tx1"/>
           </a:solidFill>
@@ -3235,10 +2861,10 @@
     </p:bodyStyle>
     <p:otherStyle>
       <a:defPPr>
-        <a:defRPr lang="de-DE"/>
+        <a:defRPr lang="en-US"/>
       </a:defPPr>
-      <a:lvl1pPr marL="0" algn="l" defTabSz="914400" rtl="0" eaLnBrk="1" latinLnBrk="0" hangingPunct="1">
-        <a:defRPr sz="1800" kern="1200">
+      <a:lvl1pPr marL="0" algn="l" defTabSz="685800" rtl="0" eaLnBrk="1" latinLnBrk="0" hangingPunct="1">
+        <a:defRPr sz="1350" kern="1200">
           <a:solidFill>
             <a:schemeClr val="tx1"/>
           </a:solidFill>
@@ -3247,8 +2873,8 @@
           <a:cs typeface="+mn-cs"/>
         </a:defRPr>
       </a:lvl1pPr>
-      <a:lvl2pPr marL="457200" algn="l" defTabSz="914400" rtl="0" eaLnBrk="1" latinLnBrk="0" hangingPunct="1">
-        <a:defRPr sz="1800" kern="1200">
+      <a:lvl2pPr marL="342900" algn="l" defTabSz="685800" rtl="0" eaLnBrk="1" latinLnBrk="0" hangingPunct="1">
+        <a:defRPr sz="1350" kern="1200">
           <a:solidFill>
             <a:schemeClr val="tx1"/>
           </a:solidFill>
@@ -3257,8 +2883,8 @@
           <a:cs typeface="+mn-cs"/>
         </a:defRPr>
       </a:lvl2pPr>
-      <a:lvl3pPr marL="914400" algn="l" defTabSz="914400" rtl="0" eaLnBrk="1" latinLnBrk="0" hangingPunct="1">
-        <a:defRPr sz="1800" kern="1200">
+      <a:lvl3pPr marL="685800" algn="l" defTabSz="685800" rtl="0" eaLnBrk="1" latinLnBrk="0" hangingPunct="1">
+        <a:defRPr sz="1350" kern="1200">
           <a:solidFill>
             <a:schemeClr val="tx1"/>
           </a:solidFill>
@@ -3267,8 +2893,8 @@
           <a:cs typeface="+mn-cs"/>
         </a:defRPr>
       </a:lvl3pPr>
-      <a:lvl4pPr marL="1371600" algn="l" defTabSz="914400" rtl="0" eaLnBrk="1" latinLnBrk="0" hangingPunct="1">
-        <a:defRPr sz="1800" kern="1200">
+      <a:lvl4pPr marL="1028700" algn="l" defTabSz="685800" rtl="0" eaLnBrk="1" latinLnBrk="0" hangingPunct="1">
+        <a:defRPr sz="1350" kern="1200">
           <a:solidFill>
             <a:schemeClr val="tx1"/>
           </a:solidFill>
@@ -3277,8 +2903,8 @@
           <a:cs typeface="+mn-cs"/>
         </a:defRPr>
       </a:lvl4pPr>
-      <a:lvl5pPr marL="1828800" algn="l" defTabSz="914400" rtl="0" eaLnBrk="1" latinLnBrk="0" hangingPunct="1">
-        <a:defRPr sz="1800" kern="1200">
+      <a:lvl5pPr marL="1371600" algn="l" defTabSz="685800" rtl="0" eaLnBrk="1" latinLnBrk="0" hangingPunct="1">
+        <a:defRPr sz="1350" kern="1200">
           <a:solidFill>
             <a:schemeClr val="tx1"/>
           </a:solidFill>
@@ -3287,8 +2913,8 @@
           <a:cs typeface="+mn-cs"/>
         </a:defRPr>
       </a:lvl5pPr>
-      <a:lvl6pPr marL="2286000" algn="l" defTabSz="914400" rtl="0" eaLnBrk="1" latinLnBrk="0" hangingPunct="1">
-        <a:defRPr sz="1800" kern="1200">
+      <a:lvl6pPr marL="1714500" algn="l" defTabSz="685800" rtl="0" eaLnBrk="1" latinLnBrk="0" hangingPunct="1">
+        <a:defRPr sz="1350" kern="1200">
           <a:solidFill>
             <a:schemeClr val="tx1"/>
           </a:solidFill>
@@ -3297,8 +2923,8 @@
           <a:cs typeface="+mn-cs"/>
         </a:defRPr>
       </a:lvl6pPr>
-      <a:lvl7pPr marL="2743200" algn="l" defTabSz="914400" rtl="0" eaLnBrk="1" latinLnBrk="0" hangingPunct="1">
-        <a:defRPr sz="1800" kern="1200">
+      <a:lvl7pPr marL="2057400" algn="l" defTabSz="685800" rtl="0" eaLnBrk="1" latinLnBrk="0" hangingPunct="1">
+        <a:defRPr sz="1350" kern="1200">
           <a:solidFill>
             <a:schemeClr val="tx1"/>
           </a:solidFill>
@@ -3307,8 +2933,8 @@
           <a:cs typeface="+mn-cs"/>
         </a:defRPr>
       </a:lvl7pPr>
-      <a:lvl8pPr marL="3200400" algn="l" defTabSz="914400" rtl="0" eaLnBrk="1" latinLnBrk="0" hangingPunct="1">
-        <a:defRPr sz="1800" kern="1200">
+      <a:lvl8pPr marL="2400300" algn="l" defTabSz="685800" rtl="0" eaLnBrk="1" latinLnBrk="0" hangingPunct="1">
+        <a:defRPr sz="1350" kern="1200">
           <a:solidFill>
             <a:schemeClr val="tx1"/>
           </a:solidFill>
@@ -3317,8 +2943,8 @@
           <a:cs typeface="+mn-cs"/>
         </a:defRPr>
       </a:lvl8pPr>
-      <a:lvl9pPr marL="3657600" algn="l" defTabSz="914400" rtl="0" eaLnBrk="1" latinLnBrk="0" hangingPunct="1">
-        <a:defRPr sz="1800" kern="1200">
+      <a:lvl9pPr marL="2743200" algn="l" defTabSz="685800" rtl="0" eaLnBrk="1" latinLnBrk="0" hangingPunct="1">
+        <a:defRPr sz="1350" kern="1200">
           <a:solidFill>
             <a:schemeClr val="tx1"/>
           </a:solidFill>
@@ -3377,8 +3003,8 @@
         </p:blipFill>
         <p:spPr>
           <a:xfrm>
-            <a:off x="2218267" y="176212"/>
-            <a:ext cx="9753600" cy="6505575"/>
+            <a:off x="-2172170" y="254529"/>
+            <a:ext cx="14088533" cy="9396942"/>
           </a:xfrm>
           <a:prstGeom prst="rect">
             <a:avLst/>
@@ -3413,8 +3039,8 @@
         </p:blipFill>
         <p:spPr>
           <a:xfrm>
-            <a:off x="2911417" y="-270933"/>
-            <a:ext cx="4574232" cy="6858000"/>
+            <a:off x="-1170953" y="-391348"/>
+            <a:ext cx="6607224" cy="9906000"/>
           </a:xfrm>
           <a:prstGeom prst="rect">
             <a:avLst/>
@@ -3478,8 +3104,8 @@
         </p:blipFill>
         <p:spPr>
           <a:xfrm>
-            <a:off x="4241801" y="2353733"/>
-            <a:ext cx="2971800" cy="2590800"/>
+            <a:off x="750713" y="3399836"/>
+            <a:ext cx="4292600" cy="3742267"/>
           </a:xfrm>
           <a:prstGeom prst="rect">
             <a:avLst/>
@@ -3500,8 +3126,8 @@
         </p:nvSpPr>
         <p:spPr>
           <a:xfrm>
-            <a:off x="4528494" y="1764001"/>
-            <a:ext cx="2398413" cy="3770263"/>
+            <a:off x="1206486" y="2548002"/>
+            <a:ext cx="3381054" cy="5404685"/>
           </a:xfrm>
           <a:prstGeom prst="rect">
             <a:avLst/>
@@ -3516,7 +3142,7 @@
           <a:p>
             <a:pPr algn="ctr"/>
             <a:r>
-              <a:rPr lang="en-US" sz="23900" dirty="0">
+              <a:rPr lang="en-US" sz="34521" dirty="0">
                 <a:latin typeface="Century Schoolbook" panose="02040604050505020304" pitchFamily="18" charset="0"/>
               </a:rPr>
               <a:t>R</a:t>
@@ -3545,8 +3171,8 @@
         </p:blipFill>
         <p:spPr>
           <a:xfrm>
-            <a:off x="-2250372" y="3660083"/>
-            <a:ext cx="2971800" cy="2497667"/>
+            <a:off x="-8626871" y="5286787"/>
+            <a:ext cx="4292600" cy="3607741"/>
           </a:xfrm>
           <a:prstGeom prst="rect">
             <a:avLst/>
@@ -3587,8 +3213,8 @@
         </p:blipFill>
         <p:spPr>
           <a:xfrm>
-            <a:off x="7618828" y="468601"/>
-            <a:ext cx="2971800" cy="2590800"/>
+            <a:off x="5628640" y="676868"/>
+            <a:ext cx="4292600" cy="3742267"/>
           </a:xfrm>
           <a:prstGeom prst="rect">
             <a:avLst/>
@@ -3609,8 +3235,8 @@
         </p:nvSpPr>
         <p:spPr>
           <a:xfrm>
-            <a:off x="7905521" y="-121131"/>
-            <a:ext cx="2398413" cy="3770263"/>
+            <a:off x="6084413" y="-174966"/>
+            <a:ext cx="3381054" cy="5404685"/>
           </a:xfrm>
           <a:prstGeom prst="rect">
             <a:avLst/>
@@ -3625,7 +3251,7 @@
           <a:p>
             <a:pPr algn="ctr"/>
             <a:r>
-              <a:rPr lang="en-US" sz="23900" dirty="0">
+              <a:rPr lang="en-US" sz="34521" dirty="0">
                 <a:latin typeface="Century Schoolbook" panose="02040604050505020304" pitchFamily="18" charset="0"/>
               </a:rPr>
               <a:t>R</a:t>
@@ -3661,8 +3287,8 @@
         </p:blipFill>
         <p:spPr>
           <a:xfrm>
-            <a:off x="7618828" y="3304934"/>
-            <a:ext cx="2971800" cy="2590800"/>
+            <a:off x="5628640" y="4773793"/>
+            <a:ext cx="4292600" cy="3742267"/>
           </a:xfrm>
           <a:prstGeom prst="rect">
             <a:avLst/>
@@ -3683,8 +3309,8 @@
         </p:nvSpPr>
         <p:spPr>
           <a:xfrm>
-            <a:off x="7905521" y="2715202"/>
-            <a:ext cx="2398413" cy="3770263"/>
+            <a:off x="6084413" y="3921959"/>
+            <a:ext cx="3381054" cy="5404685"/>
           </a:xfrm>
           <a:prstGeom prst="rect">
             <a:avLst/>
@@ -3699,7 +3325,7 @@
           <a:p>
             <a:pPr algn="ctr"/>
             <a:r>
-              <a:rPr lang="en-US" sz="23900" dirty="0">
+              <a:rPr lang="en-US" sz="34521" dirty="0">
                 <a:latin typeface="Century Schoolbook" panose="02040604050505020304" pitchFamily="18" charset="0"/>
               </a:rPr>
               <a:t>R</a:t>
@@ -3735,8 +3361,8 @@
         </p:blipFill>
         <p:spPr>
           <a:xfrm>
-            <a:off x="1067389" y="3894666"/>
-            <a:ext cx="2971800" cy="2590800"/>
+            <a:off x="-3834549" y="5625629"/>
+            <a:ext cx="4292600" cy="3742267"/>
           </a:xfrm>
           <a:prstGeom prst="rect">
             <a:avLst/>
@@ -3757,8 +3383,8 @@
         </p:nvSpPr>
         <p:spPr>
           <a:xfrm>
-            <a:off x="1354082" y="3304934"/>
-            <a:ext cx="2398413" cy="3770263"/>
+            <a:off x="-3378776" y="4773794"/>
+            <a:ext cx="3381054" cy="5404685"/>
           </a:xfrm>
           <a:prstGeom prst="rect">
             <a:avLst/>
@@ -3773,7 +3399,7 @@
           <a:p>
             <a:pPr algn="ctr"/>
             <a:r>
-              <a:rPr lang="en-US" sz="23900" dirty="0">
+              <a:rPr lang="en-US" sz="34521" dirty="0">
                 <a:latin typeface="Century Schoolbook" panose="02040604050505020304" pitchFamily="18" charset="0"/>
               </a:rPr>
               <a:t>R</a:t>
@@ -3795,8 +3421,8 @@
         </p:nvSpPr>
         <p:spPr>
           <a:xfrm>
-            <a:off x="1354081" y="3304934"/>
-            <a:ext cx="2398413" cy="3770263"/>
+            <a:off x="-3378778" y="4773794"/>
+            <a:ext cx="3381054" cy="5404685"/>
           </a:xfrm>
           <a:prstGeom prst="rect">
             <a:avLst/>
@@ -3811,7 +3437,7 @@
           <a:p>
             <a:pPr algn="ctr"/>
             <a:r>
-              <a:rPr lang="en-US" sz="23900" dirty="0">
+              <a:rPr lang="en-US" sz="34521" dirty="0">
                 <a:solidFill>
                   <a:schemeClr val="bg1"/>
                 </a:solidFill>
@@ -3850,8 +3476,8 @@
         </p:blipFill>
         <p:spPr>
           <a:xfrm>
-            <a:off x="-2284826" y="558800"/>
-            <a:ext cx="3006254" cy="2590800"/>
+            <a:off x="-8676638" y="807155"/>
+            <a:ext cx="4342367" cy="3742267"/>
           </a:xfrm>
           <a:prstGeom prst="rect">
             <a:avLst/>
@@ -3902,14 +3528,16 @@
         </p:nvSpPr>
         <p:spPr>
           <a:xfrm>
-            <a:off x="3039532" y="423333"/>
-            <a:ext cx="4224867" cy="5850467"/>
+            <a:off x="-106680" y="-195072"/>
+            <a:ext cx="7056120" cy="10168128"/>
           </a:xfrm>
           <a:prstGeom prst="rect">
             <a:avLst/>
           </a:prstGeom>
           <a:ln>
-            <a:noFill/>
+            <a:solidFill>
+              <a:srgbClr val="009DD1"/>
+            </a:solidFill>
           </a:ln>
         </p:spPr>
         <p:style>
@@ -3933,7 +3561,7 @@
           <a:lstStyle/>
           <a:p>
             <a:pPr algn="ctr"/>
-            <a:endParaRPr lang="en-US"/>
+            <a:endParaRPr lang="en-US" sz="2600"/>
           </a:p>
         </p:txBody>
       </p:sp>
@@ -3951,8 +3579,8 @@
         </p:nvSpPr>
         <p:spPr>
           <a:xfrm>
-            <a:off x="3039531" y="612928"/>
-            <a:ext cx="4224867" cy="1015663"/>
+            <a:off x="377706" y="355805"/>
+            <a:ext cx="6102586" cy="1426160"/>
           </a:xfrm>
           <a:prstGeom prst="rect">
             <a:avLst/>
@@ -3967,21 +3595,19 @@
           <a:p>
             <a:pPr algn="ctr"/>
             <a:r>
-              <a:rPr lang="en-US" sz="2000" b="1" i="0" dirty="0">
+              <a:rPr lang="en-US" sz="2889" b="1" dirty="0">
                 <a:solidFill>
                   <a:srgbClr val="D7D7D7"/>
                 </a:solidFill>
-                <a:effectLst/>
                 <a:latin typeface="Century Schoolbook" panose="02040604050505020304" pitchFamily="18" charset="0"/>
               </a:rPr>
               <a:t>Handbook on Conducting </a:t>
             </a:r>
             <a:r>
-              <a:rPr lang="en-US" sz="2000" b="1" i="0" dirty="0">
+              <a:rPr lang="en-US" sz="2889" b="1" dirty="0">
                 <a:solidFill>
-                  <a:srgbClr val="00B0F0"/>
+                  <a:srgbClr val="009DD1"/>
                 </a:solidFill>
-                <a:effectLst/>
                 <a:latin typeface="Century Schoolbook" panose="02040604050505020304" pitchFamily="18" charset="0"/>
               </a:rPr>
               <a:t>Reproduction and Replication Studies</a:t>
@@ -4016,8 +3642,8 @@
         </p:blipFill>
         <p:spPr>
           <a:xfrm>
-            <a:off x="3680460" y="1818186"/>
-            <a:ext cx="2957404" cy="2578250"/>
+            <a:off x="855156" y="2137769"/>
+            <a:ext cx="5168478" cy="4505854"/>
           </a:xfrm>
           <a:prstGeom prst="rect">
             <a:avLst/>
@@ -4038,8 +3664,8 @@
         </p:nvSpPr>
         <p:spPr>
           <a:xfrm>
-            <a:off x="3240189" y="4586031"/>
-            <a:ext cx="3823552" cy="646331"/>
+            <a:off x="667545" y="7259095"/>
+            <a:ext cx="5522908" cy="1169551"/>
           </a:xfrm>
           <a:prstGeom prst="rect">
             <a:avLst/>
@@ -4054,176 +3680,159 @@
           <a:p>
             <a:pPr algn="ctr"/>
             <a:r>
-              <a:rPr lang="de-DE" sz="900" i="0" dirty="0">
+              <a:rPr lang="de-DE" sz="1400" dirty="0">
                 <a:solidFill>
                   <a:srgbClr val="D7D7D7"/>
                 </a:solidFill>
-                <a:effectLst/>
                 <a:latin typeface="Century Schoolbook" panose="02040604050505020304" pitchFamily="18" charset="0"/>
               </a:rPr>
               <a:t>Lukas Röseler*, Lukas </a:t>
             </a:r>
             <a:r>
-              <a:rPr lang="de-DE" sz="900" i="0" dirty="0" err="1">
+              <a:rPr lang="de-DE" sz="1400" dirty="0" err="1">
                 <a:solidFill>
                   <a:srgbClr val="D7D7D7"/>
                 </a:solidFill>
-                <a:effectLst/>
                 <a:latin typeface="Century Schoolbook" panose="02040604050505020304" pitchFamily="18" charset="0"/>
               </a:rPr>
               <a:t>Wallrich</a:t>
             </a:r>
             <a:r>
-              <a:rPr lang="de-DE" sz="900" i="0" dirty="0">
+              <a:rPr lang="de-DE" sz="1400" dirty="0">
                 <a:solidFill>
                   <a:srgbClr val="D7D7D7"/>
                 </a:solidFill>
-                <a:effectLst/>
                 <a:latin typeface="Century Schoolbook" panose="02040604050505020304" pitchFamily="18" charset="0"/>
               </a:rPr>
               <a:t>*, Helena Hartmann, Luisa </a:t>
             </a:r>
             <a:r>
-              <a:rPr lang="de-DE" sz="900" i="0" dirty="0" err="1">
+              <a:rPr lang="de-DE" sz="1400" dirty="0" err="1">
                 <a:solidFill>
                   <a:srgbClr val="D7D7D7"/>
                 </a:solidFill>
-                <a:effectLst/>
                 <a:latin typeface="Century Schoolbook" panose="02040604050505020304" pitchFamily="18" charset="0"/>
               </a:rPr>
               <a:t>Altegoer</a:t>
             </a:r>
             <a:r>
-              <a:rPr lang="de-DE" sz="900" i="0" dirty="0">
+              <a:rPr lang="de-DE" sz="1400" dirty="0">
                 <a:solidFill>
                   <a:srgbClr val="D7D7D7"/>
                 </a:solidFill>
-                <a:effectLst/>
                 <a:latin typeface="Century Schoolbook" panose="02040604050505020304" pitchFamily="18" charset="0"/>
               </a:rPr>
               <a:t>, Veronica Boyce, </a:t>
             </a:r>
             <a:r>
-              <a:rPr lang="de-DE" sz="900" i="0" dirty="0" err="1">
+              <a:rPr lang="de-DE" sz="1400" dirty="0" err="1">
                 <a:solidFill>
                   <a:srgbClr val="D7D7D7"/>
                 </a:solidFill>
-                <a:effectLst/>
                 <a:latin typeface="Century Schoolbook" panose="02040604050505020304" pitchFamily="18" charset="0"/>
               </a:rPr>
               <a:t>Sarahanne</a:t>
             </a:r>
             <a:r>
-              <a:rPr lang="de-DE" sz="900" i="0" dirty="0">
+              <a:rPr lang="de-DE" sz="1400" dirty="0">
                 <a:solidFill>
                   <a:srgbClr val="D7D7D7"/>
                 </a:solidFill>
-                <a:effectLst/>
                 <a:latin typeface="Century Schoolbook" panose="02040604050505020304" pitchFamily="18" charset="0"/>
               </a:rPr>
               <a:t> M. Field, Janik </a:t>
             </a:r>
             <a:r>
-              <a:rPr lang="de-DE" sz="900" i="0" dirty="0" err="1">
+              <a:rPr lang="de-DE" sz="1400" dirty="0" err="1">
                 <a:solidFill>
                   <a:srgbClr val="D7D7D7"/>
                 </a:solidFill>
-                <a:effectLst/>
                 <a:latin typeface="Century Schoolbook" panose="02040604050505020304" pitchFamily="18" charset="0"/>
               </a:rPr>
               <a:t>Goltermann</a:t>
             </a:r>
             <a:r>
-              <a:rPr lang="de-DE" sz="900" i="0" dirty="0">
+              <a:rPr lang="de-DE" sz="1400" dirty="0">
                 <a:solidFill>
                   <a:srgbClr val="D7D7D7"/>
                 </a:solidFill>
-                <a:effectLst/>
                 <a:latin typeface="Century Schoolbook" panose="02040604050505020304" pitchFamily="18" charset="0"/>
               </a:rPr>
               <a:t>, Joachim </a:t>
             </a:r>
             <a:r>
-              <a:rPr lang="de-DE" sz="900" i="0" dirty="0" err="1">
+              <a:rPr lang="de-DE" sz="1400" dirty="0" err="1">
                 <a:solidFill>
                   <a:srgbClr val="D7D7D7"/>
                 </a:solidFill>
-                <a:effectLst/>
                 <a:latin typeface="Century Schoolbook" panose="02040604050505020304" pitchFamily="18" charset="0"/>
               </a:rPr>
               <a:t>Hüffmeier</a:t>
             </a:r>
             <a:r>
-              <a:rPr lang="de-DE" sz="900" i="0" dirty="0">
+              <a:rPr lang="de-DE" sz="1400" dirty="0">
                 <a:solidFill>
                   <a:srgbClr val="D7D7D7"/>
                 </a:solidFill>
-                <a:effectLst/>
                 <a:latin typeface="Century Schoolbook" panose="02040604050505020304" pitchFamily="18" charset="0"/>
               </a:rPr>
               <a:t>, Charlotte R. Pennington, Merle-Marie </a:t>
             </a:r>
             <a:r>
-              <a:rPr lang="de-DE" sz="900" i="0" dirty="0" err="1">
+              <a:rPr lang="de-DE" sz="1400" dirty="0" err="1">
                 <a:solidFill>
                   <a:srgbClr val="D7D7D7"/>
                 </a:solidFill>
-                <a:effectLst/>
                 <a:latin typeface="Century Schoolbook" panose="02040604050505020304" pitchFamily="18" charset="0"/>
               </a:rPr>
               <a:t>Pittelkow</a:t>
             </a:r>
             <a:r>
-              <a:rPr lang="de-DE" sz="900" i="0" dirty="0">
+              <a:rPr lang="de-DE" sz="1400" dirty="0">
                 <a:solidFill>
                   <a:srgbClr val="D7D7D7"/>
                 </a:solidFill>
-                <a:effectLst/>
                 <a:latin typeface="Century Schoolbook" panose="02040604050505020304" pitchFamily="18" charset="0"/>
               </a:rPr>
               <a:t>, </a:t>
             </a:r>
             <a:r>
-              <a:rPr lang="de-DE" sz="900" i="0" dirty="0" err="1">
+              <a:rPr lang="de-DE" sz="1400" dirty="0" err="1">
                 <a:solidFill>
                   <a:srgbClr val="D7D7D7"/>
                 </a:solidFill>
-                <a:effectLst/>
                 <a:latin typeface="Century Schoolbook" panose="02040604050505020304" pitchFamily="18" charset="0"/>
               </a:rPr>
               <a:t>Priya</a:t>
             </a:r>
             <a:r>
-              <a:rPr lang="de-DE" sz="900" i="0" dirty="0">
+              <a:rPr lang="de-DE" sz="1400" dirty="0">
                 <a:solidFill>
                   <a:srgbClr val="D7D7D7"/>
                 </a:solidFill>
-                <a:effectLst/>
                 <a:latin typeface="Century Schoolbook" panose="02040604050505020304" pitchFamily="18" charset="0"/>
               </a:rPr>
               <a:t> Silverstein, Don van </a:t>
             </a:r>
             <a:r>
-              <a:rPr lang="de-DE" sz="900" i="0" dirty="0" err="1">
+              <a:rPr lang="de-DE" sz="1400" dirty="0" err="1">
                 <a:solidFill>
                   <a:srgbClr val="D7D7D7"/>
                 </a:solidFill>
-                <a:effectLst/>
                 <a:latin typeface="Century Schoolbook" panose="02040604050505020304" pitchFamily="18" charset="0"/>
               </a:rPr>
               <a:t>Ravenzwaaij</a:t>
             </a:r>
             <a:r>
-              <a:rPr lang="de-DE" sz="900" i="0" dirty="0">
+              <a:rPr lang="de-DE" sz="1400" dirty="0">
                 <a:solidFill>
                   <a:srgbClr val="D7D7D7"/>
                 </a:solidFill>
-                <a:effectLst/>
                 <a:latin typeface="Century Schoolbook" panose="02040604050505020304" pitchFamily="18" charset="0"/>
               </a:rPr>
               <a:t>, Flavio Azevedo</a:t>
             </a:r>
-            <a:endParaRPr lang="en-US" sz="900" dirty="0">
+            <a:endParaRPr lang="en-US" sz="1400" dirty="0">
               <a:solidFill>
                 <a:srgbClr val="D7D7D7"/>
               </a:solidFill>
@@ -4254,8 +3863,8 @@
         </p:blipFill>
         <p:spPr>
           <a:xfrm>
-            <a:off x="3668181" y="5758646"/>
-            <a:ext cx="1245451" cy="394130"/>
+            <a:off x="1285756" y="9053478"/>
+            <a:ext cx="1798985" cy="569299"/>
           </a:xfrm>
           <a:prstGeom prst="rect">
             <a:avLst/>
@@ -4284,8 +3893,8 @@
         </p:blipFill>
         <p:spPr>
           <a:xfrm>
-            <a:off x="5412105" y="5752165"/>
-            <a:ext cx="1353821" cy="407093"/>
+            <a:off x="3804758" y="9044118"/>
+            <a:ext cx="1955519" cy="588023"/>
           </a:xfrm>
           <a:prstGeom prst="rect">
             <a:avLst/>
@@ -4294,10 +3903,10 @@
       </p:pic>
       <p:pic>
         <p:nvPicPr>
-          <p:cNvPr id="18" name="Grafik 17">
+          <p:cNvPr id="7" name="Grafik 6">
             <a:extLst>
               <a:ext uri="{FF2B5EF4-FFF2-40B4-BE49-F238E27FC236}">
-                <a16:creationId xmlns:a16="http://schemas.microsoft.com/office/drawing/2014/main" id="{715C91F5-DCE0-116E-92FC-EF9C4090D4FA}"/>
+                <a16:creationId xmlns:a16="http://schemas.microsoft.com/office/drawing/2014/main" id="{423CA296-B605-408D-9F3B-53CE3255140F}"/>
               </a:ext>
             </a:extLst>
           </p:cNvPr>
@@ -4314,8 +3923,8 @@
         </p:blipFill>
         <p:spPr>
           <a:xfrm>
-            <a:off x="6815687" y="149610"/>
-            <a:ext cx="4389500" cy="5852667"/>
+            <a:off x="-4063820" y="-195072"/>
+            <a:ext cx="6858000" cy="9870559"/>
           </a:xfrm>
           <a:prstGeom prst="rect">
             <a:avLst/>

</xml_diff>

<commit_message>
- Added info on last update - Updated title and cover page - Updated date of publication
</commit_message>
<xml_diff>
--- a/images/cover.pptx
+++ b/images/cover.pptx
@@ -245,7 +245,7 @@
           <a:p>
             <a:fld id="{51E51E49-77BA-4FD5-BB46-972D51D76856}" type="datetimeFigureOut">
               <a:rPr lang="en-US" smtClean="0"/>
-              <a:t>8/6/2025</a:t>
+              <a:t>8/8/2025</a:t>
             </a:fld>
             <a:endParaRPr lang="en-US"/>
           </a:p>
@@ -415,7 +415,7 @@
           <a:p>
             <a:fld id="{51E51E49-77BA-4FD5-BB46-972D51D76856}" type="datetimeFigureOut">
               <a:rPr lang="en-US" smtClean="0"/>
-              <a:t>8/6/2025</a:t>
+              <a:t>8/8/2025</a:t>
             </a:fld>
             <a:endParaRPr lang="en-US"/>
           </a:p>
@@ -595,7 +595,7 @@
           <a:p>
             <a:fld id="{51E51E49-77BA-4FD5-BB46-972D51D76856}" type="datetimeFigureOut">
               <a:rPr lang="en-US" smtClean="0"/>
-              <a:t>8/6/2025</a:t>
+              <a:t>8/8/2025</a:t>
             </a:fld>
             <a:endParaRPr lang="en-US"/>
           </a:p>
@@ -765,7 +765,7 @@
           <a:p>
             <a:fld id="{51E51E49-77BA-4FD5-BB46-972D51D76856}" type="datetimeFigureOut">
               <a:rPr lang="en-US" smtClean="0"/>
-              <a:t>8/6/2025</a:t>
+              <a:t>8/8/2025</a:t>
             </a:fld>
             <a:endParaRPr lang="en-US"/>
           </a:p>
@@ -1011,7 +1011,7 @@
           <a:p>
             <a:fld id="{51E51E49-77BA-4FD5-BB46-972D51D76856}" type="datetimeFigureOut">
               <a:rPr lang="en-US" smtClean="0"/>
-              <a:t>8/6/2025</a:t>
+              <a:t>8/8/2025</a:t>
             </a:fld>
             <a:endParaRPr lang="en-US"/>
           </a:p>
@@ -1243,7 +1243,7 @@
           <a:p>
             <a:fld id="{51E51E49-77BA-4FD5-BB46-972D51D76856}" type="datetimeFigureOut">
               <a:rPr lang="en-US" smtClean="0"/>
-              <a:t>8/6/2025</a:t>
+              <a:t>8/8/2025</a:t>
             </a:fld>
             <a:endParaRPr lang="en-US"/>
           </a:p>
@@ -1610,7 +1610,7 @@
           <a:p>
             <a:fld id="{51E51E49-77BA-4FD5-BB46-972D51D76856}" type="datetimeFigureOut">
               <a:rPr lang="en-US" smtClean="0"/>
-              <a:t>8/6/2025</a:t>
+              <a:t>8/8/2025</a:t>
             </a:fld>
             <a:endParaRPr lang="en-US"/>
           </a:p>
@@ -1728,7 +1728,7 @@
           <a:p>
             <a:fld id="{51E51E49-77BA-4FD5-BB46-972D51D76856}" type="datetimeFigureOut">
               <a:rPr lang="en-US" smtClean="0"/>
-              <a:t>8/6/2025</a:t>
+              <a:t>8/8/2025</a:t>
             </a:fld>
             <a:endParaRPr lang="en-US"/>
           </a:p>
@@ -1823,7 +1823,7 @@
           <a:p>
             <a:fld id="{51E51E49-77BA-4FD5-BB46-972D51D76856}" type="datetimeFigureOut">
               <a:rPr lang="en-US" smtClean="0"/>
-              <a:t>8/6/2025</a:t>
+              <a:t>8/8/2025</a:t>
             </a:fld>
             <a:endParaRPr lang="en-US"/>
           </a:p>
@@ -2100,7 +2100,7 @@
           <a:p>
             <a:fld id="{51E51E49-77BA-4FD5-BB46-972D51D76856}" type="datetimeFigureOut">
               <a:rPr lang="en-US" smtClean="0"/>
-              <a:t>8/6/2025</a:t>
+              <a:t>8/8/2025</a:t>
             </a:fld>
             <a:endParaRPr lang="en-US"/>
           </a:p>
@@ -2357,7 +2357,7 @@
           <a:p>
             <a:fld id="{51E51E49-77BA-4FD5-BB46-972D51D76856}" type="datetimeFigureOut">
               <a:rPr lang="en-US" smtClean="0"/>
-              <a:t>8/6/2025</a:t>
+              <a:t>8/8/2025</a:t>
             </a:fld>
             <a:endParaRPr lang="en-US"/>
           </a:p>
@@ -2570,7 +2570,7 @@
           <a:p>
             <a:fld id="{51E51E49-77BA-4FD5-BB46-972D51D76856}" type="datetimeFigureOut">
               <a:rPr lang="en-US" smtClean="0"/>
-              <a:t>8/6/2025</a:t>
+              <a:t>8/8/2025</a:t>
             </a:fld>
             <a:endParaRPr lang="en-US"/>
           </a:p>
@@ -3528,8 +3528,8 @@
         </p:nvSpPr>
         <p:spPr>
           <a:xfrm>
-            <a:off x="-106680" y="-195072"/>
-            <a:ext cx="7056120" cy="10168128"/>
+            <a:off x="-274320" y="-195072"/>
+            <a:ext cx="7391400" cy="10168128"/>
           </a:xfrm>
           <a:prstGeom prst="rect">
             <a:avLst/>
@@ -3601,8 +3601,16 @@
                 </a:solidFill>
                 <a:latin typeface="Century Schoolbook" panose="02040604050505020304" pitchFamily="18" charset="0"/>
               </a:rPr>
-              <a:t>Handbook on Conducting </a:t>
-            </a:r>
+              <a:t>Handbook for </a:t>
+            </a:r>
+            <a:br>
+              <a:rPr lang="en-US" sz="2889" b="1" dirty="0">
+                <a:solidFill>
+                  <a:srgbClr val="D7D7D7"/>
+                </a:solidFill>
+                <a:latin typeface="Century Schoolbook" panose="02040604050505020304" pitchFamily="18" charset="0"/>
+              </a:rPr>
+            </a:br>
             <a:r>
               <a:rPr lang="en-US" sz="2889" b="1" dirty="0">
                 <a:solidFill>
@@ -3631,6 +3639,7 @@
         </p:nvPicPr>
         <p:blipFill>
           <a:blip r:embed="rId2">
+            <a:biLevel thresh="75000"/>
             <a:extLst>
               <a:ext uri="{28A0092B-C50C-407E-A947-70E740481C1C}">
                 <a14:useLocalDpi xmlns:a14="http://schemas.microsoft.com/office/drawing/2010/main" val="0"/>
@@ -3642,8 +3651,8 @@
         </p:blipFill>
         <p:spPr>
           <a:xfrm>
-            <a:off x="855156" y="2137769"/>
-            <a:ext cx="5168478" cy="4505854"/>
+            <a:off x="-97536" y="2332842"/>
+            <a:ext cx="7107936" cy="4084989"/>
           </a:xfrm>
           <a:prstGeom prst="rect">
             <a:avLst/>
@@ -3903,10 +3912,10 @@
       </p:pic>
       <p:pic>
         <p:nvPicPr>
-          <p:cNvPr id="7" name="Grafik 6">
+          <p:cNvPr id="3" name="Grafik 2">
             <a:extLst>
               <a:ext uri="{FF2B5EF4-FFF2-40B4-BE49-F238E27FC236}">
-                <a16:creationId xmlns:a16="http://schemas.microsoft.com/office/drawing/2014/main" id="{423CA296-B605-408D-9F3B-53CE3255140F}"/>
+                <a16:creationId xmlns:a16="http://schemas.microsoft.com/office/drawing/2014/main" id="{3D7AF581-004B-C39E-9FE2-C529250C24EC}"/>
               </a:ext>
             </a:extLst>
           </p:cNvPr>
@@ -3923,8 +3932,8 @@
         </p:blipFill>
         <p:spPr>
           <a:xfrm>
-            <a:off x="-4063820" y="-195072"/>
-            <a:ext cx="6858000" cy="9870559"/>
+            <a:off x="-4410045" y="126085"/>
+            <a:ext cx="6858000" cy="9424110"/>
           </a:xfrm>
           <a:prstGeom prst="rect">
             <a:avLst/>

</xml_diff>